<commit_message>
Update or Add ppts
</commit_message>
<xml_diff>
--- a/2019/4月.pptx
+++ b/2019/4月.pptx
@@ -7,9 +7,15 @@
   <p:sldIdLst>
     <p:sldId id="257" r:id="rId2"/>
     <p:sldId id="258" r:id="rId3"/>
-    <p:sldId id="259" r:id="rId4"/>
-    <p:sldId id="260" r:id="rId5"/>
-    <p:sldId id="261" r:id="rId6"/>
+    <p:sldId id="266" r:id="rId4"/>
+    <p:sldId id="267" r:id="rId5"/>
+    <p:sldId id="259" r:id="rId6"/>
+    <p:sldId id="260" r:id="rId7"/>
+    <p:sldId id="261" r:id="rId8"/>
+    <p:sldId id="262" r:id="rId9"/>
+    <p:sldId id="263" r:id="rId10"/>
+    <p:sldId id="264" r:id="rId11"/>
+    <p:sldId id="265" r:id="rId12"/>
   </p:sldIdLst>
   <p:sldSz cx="9144000" cy="6858000" type="screen4x3"/>
   <p:notesSz cx="6858000" cy="9144000"/>
@@ -292,7 +298,8 @@
           <a:p>
             <a:fld id="{93C479E1-49E9-4258-961C-908417C7F37C}" type="datetimeFigureOut">
               <a:rPr lang="zh-TW" altLang="en-US" smtClean="0"/>
-              <a:t>2019/4/7</a:t>
+              <a:pPr/>
+              <a:t>2019/4/28</a:t>
             </a:fld>
             <a:endParaRPr lang="zh-TW" altLang="en-US"/>
           </a:p>
@@ -334,6 +341,7 @@
           <a:p>
             <a:fld id="{705C7472-DD9C-4F00-9113-F58447810D03}" type="slidenum">
               <a:rPr lang="zh-TW" altLang="en-US" smtClean="0"/>
+              <a:pPr/>
               <a:t>‹#›</a:t>
             </a:fld>
             <a:endParaRPr lang="zh-TW" altLang="en-US"/>
@@ -457,7 +465,8 @@
           <a:p>
             <a:fld id="{93C479E1-49E9-4258-961C-908417C7F37C}" type="datetimeFigureOut">
               <a:rPr lang="zh-TW" altLang="en-US" smtClean="0"/>
-              <a:t>2019/4/7</a:t>
+              <a:pPr/>
+              <a:t>2019/4/28</a:t>
             </a:fld>
             <a:endParaRPr lang="zh-TW" altLang="en-US"/>
           </a:p>
@@ -499,6 +508,7 @@
           <a:p>
             <a:fld id="{705C7472-DD9C-4F00-9113-F58447810D03}" type="slidenum">
               <a:rPr lang="zh-TW" altLang="en-US" smtClean="0"/>
+              <a:pPr/>
               <a:t>‹#›</a:t>
             </a:fld>
             <a:endParaRPr lang="zh-TW" altLang="en-US"/>
@@ -632,7 +642,8 @@
           <a:p>
             <a:fld id="{93C479E1-49E9-4258-961C-908417C7F37C}" type="datetimeFigureOut">
               <a:rPr lang="zh-TW" altLang="en-US" smtClean="0"/>
-              <a:t>2019/4/7</a:t>
+              <a:pPr/>
+              <a:t>2019/4/28</a:t>
             </a:fld>
             <a:endParaRPr lang="zh-TW" altLang="en-US"/>
           </a:p>
@@ -674,6 +685,7 @@
           <a:p>
             <a:fld id="{705C7472-DD9C-4F00-9113-F58447810D03}" type="slidenum">
               <a:rPr lang="zh-TW" altLang="en-US" smtClean="0"/>
+              <a:pPr/>
               <a:t>‹#›</a:t>
             </a:fld>
             <a:endParaRPr lang="zh-TW" altLang="en-US"/>
@@ -797,7 +809,8 @@
           <a:p>
             <a:fld id="{93C479E1-49E9-4258-961C-908417C7F37C}" type="datetimeFigureOut">
               <a:rPr lang="zh-TW" altLang="en-US" smtClean="0"/>
-              <a:t>2019/4/7</a:t>
+              <a:pPr/>
+              <a:t>2019/4/28</a:t>
             </a:fld>
             <a:endParaRPr lang="zh-TW" altLang="en-US"/>
           </a:p>
@@ -839,6 +852,7 @@
           <a:p>
             <a:fld id="{705C7472-DD9C-4F00-9113-F58447810D03}" type="slidenum">
               <a:rPr lang="zh-TW" altLang="en-US" smtClean="0"/>
+              <a:pPr/>
               <a:t>‹#›</a:t>
             </a:fld>
             <a:endParaRPr lang="zh-TW" altLang="en-US"/>
@@ -1038,7 +1052,8 @@
           <a:p>
             <a:fld id="{93C479E1-49E9-4258-961C-908417C7F37C}" type="datetimeFigureOut">
               <a:rPr lang="zh-TW" altLang="en-US" smtClean="0"/>
-              <a:t>2019/4/7</a:t>
+              <a:pPr/>
+              <a:t>2019/4/28</a:t>
             </a:fld>
             <a:endParaRPr lang="zh-TW" altLang="en-US"/>
           </a:p>
@@ -1080,6 +1095,7 @@
           <a:p>
             <a:fld id="{705C7472-DD9C-4F00-9113-F58447810D03}" type="slidenum">
               <a:rPr lang="zh-TW" altLang="en-US" smtClean="0"/>
+              <a:pPr/>
               <a:t>‹#›</a:t>
             </a:fld>
             <a:endParaRPr lang="zh-TW" altLang="en-US"/>
@@ -1321,7 +1337,8 @@
           <a:p>
             <a:fld id="{93C479E1-49E9-4258-961C-908417C7F37C}" type="datetimeFigureOut">
               <a:rPr lang="zh-TW" altLang="en-US" smtClean="0"/>
-              <a:t>2019/4/7</a:t>
+              <a:pPr/>
+              <a:t>2019/4/28</a:t>
             </a:fld>
             <a:endParaRPr lang="zh-TW" altLang="en-US"/>
           </a:p>
@@ -1363,6 +1380,7 @@
           <a:p>
             <a:fld id="{705C7472-DD9C-4F00-9113-F58447810D03}" type="slidenum">
               <a:rPr lang="zh-TW" altLang="en-US" smtClean="0"/>
+              <a:pPr/>
               <a:t>‹#›</a:t>
             </a:fld>
             <a:endParaRPr lang="zh-TW" altLang="en-US"/>
@@ -1738,7 +1756,8 @@
           <a:p>
             <a:fld id="{93C479E1-49E9-4258-961C-908417C7F37C}" type="datetimeFigureOut">
               <a:rPr lang="zh-TW" altLang="en-US" smtClean="0"/>
-              <a:t>2019/4/7</a:t>
+              <a:pPr/>
+              <a:t>2019/4/28</a:t>
             </a:fld>
             <a:endParaRPr lang="zh-TW" altLang="en-US"/>
           </a:p>
@@ -1780,6 +1799,7 @@
           <a:p>
             <a:fld id="{705C7472-DD9C-4F00-9113-F58447810D03}" type="slidenum">
               <a:rPr lang="zh-TW" altLang="en-US" smtClean="0"/>
+              <a:pPr/>
               <a:t>‹#›</a:t>
             </a:fld>
             <a:endParaRPr lang="zh-TW" altLang="en-US"/>
@@ -1851,7 +1871,8 @@
           <a:p>
             <a:fld id="{93C479E1-49E9-4258-961C-908417C7F37C}" type="datetimeFigureOut">
               <a:rPr lang="zh-TW" altLang="en-US" smtClean="0"/>
-              <a:t>2019/4/7</a:t>
+              <a:pPr/>
+              <a:t>2019/4/28</a:t>
             </a:fld>
             <a:endParaRPr lang="zh-TW" altLang="en-US"/>
           </a:p>
@@ -1893,6 +1914,7 @@
           <a:p>
             <a:fld id="{705C7472-DD9C-4F00-9113-F58447810D03}" type="slidenum">
               <a:rPr lang="zh-TW" altLang="en-US" smtClean="0"/>
+              <a:pPr/>
               <a:t>‹#›</a:t>
             </a:fld>
             <a:endParaRPr lang="zh-TW" altLang="en-US"/>
@@ -1941,7 +1963,8 @@
           <a:p>
             <a:fld id="{93C479E1-49E9-4258-961C-908417C7F37C}" type="datetimeFigureOut">
               <a:rPr lang="zh-TW" altLang="en-US" smtClean="0"/>
-              <a:t>2019/4/7</a:t>
+              <a:pPr/>
+              <a:t>2019/4/28</a:t>
             </a:fld>
             <a:endParaRPr lang="zh-TW" altLang="en-US"/>
           </a:p>
@@ -1983,6 +2006,7 @@
           <a:p>
             <a:fld id="{705C7472-DD9C-4F00-9113-F58447810D03}" type="slidenum">
               <a:rPr lang="zh-TW" altLang="en-US" smtClean="0"/>
+              <a:pPr/>
               <a:t>‹#›</a:t>
             </a:fld>
             <a:endParaRPr lang="zh-TW" altLang="en-US"/>
@@ -2213,7 +2237,8 @@
           <a:p>
             <a:fld id="{93C479E1-49E9-4258-961C-908417C7F37C}" type="datetimeFigureOut">
               <a:rPr lang="zh-TW" altLang="en-US" smtClean="0"/>
-              <a:t>2019/4/7</a:t>
+              <a:pPr/>
+              <a:t>2019/4/28</a:t>
             </a:fld>
             <a:endParaRPr lang="zh-TW" altLang="en-US"/>
           </a:p>
@@ -2255,6 +2280,7 @@
           <a:p>
             <a:fld id="{705C7472-DD9C-4F00-9113-F58447810D03}" type="slidenum">
               <a:rPr lang="zh-TW" altLang="en-US" smtClean="0"/>
+              <a:pPr/>
               <a:t>‹#›</a:t>
             </a:fld>
             <a:endParaRPr lang="zh-TW" altLang="en-US"/>
@@ -2465,7 +2491,8 @@
           <a:p>
             <a:fld id="{93C479E1-49E9-4258-961C-908417C7F37C}" type="datetimeFigureOut">
               <a:rPr lang="zh-TW" altLang="en-US" smtClean="0"/>
-              <a:t>2019/4/7</a:t>
+              <a:pPr/>
+              <a:t>2019/4/28</a:t>
             </a:fld>
             <a:endParaRPr lang="zh-TW" altLang="en-US"/>
           </a:p>
@@ -2507,6 +2534,7 @@
           <a:p>
             <a:fld id="{705C7472-DD9C-4F00-9113-F58447810D03}" type="slidenum">
               <a:rPr lang="zh-TW" altLang="en-US" smtClean="0"/>
+              <a:pPr/>
               <a:t>‹#›</a:t>
             </a:fld>
             <a:endParaRPr lang="zh-TW" altLang="en-US"/>
@@ -2678,7 +2706,8 @@
           <a:p>
             <a:fld id="{93C479E1-49E9-4258-961C-908417C7F37C}" type="datetimeFigureOut">
               <a:rPr lang="zh-TW" altLang="en-US" smtClean="0"/>
-              <a:t>2019/4/7</a:t>
+              <a:pPr/>
+              <a:t>2019/4/28</a:t>
             </a:fld>
             <a:endParaRPr lang="zh-TW" altLang="en-US"/>
           </a:p>
@@ -2756,6 +2785,7 @@
           <a:p>
             <a:fld id="{705C7472-DD9C-4F00-9113-F58447810D03}" type="slidenum">
               <a:rPr lang="zh-TW" altLang="en-US" smtClean="0"/>
+              <a:pPr/>
               <a:t>‹#›</a:t>
             </a:fld>
             <a:endParaRPr lang="zh-TW" altLang="en-US"/>
@@ -3261,17 +3291,7 @@
                 <a:latin typeface="微軟正黑體" pitchFamily="34" charset="-120"/>
                 <a:ea typeface="微軟正黑體" pitchFamily="34" charset="-120"/>
               </a:rPr>
-              <a:t> </a:t>
-            </a:r>
-            <a:r>
-              <a:rPr lang="zh-TW" altLang="en-US" sz="5400" b="1" dirty="0" smtClean="0">
-                <a:solidFill>
-                  <a:srgbClr val="002060"/>
-                </a:solidFill>
-                <a:latin typeface="微軟正黑體" pitchFamily="34" charset="-120"/>
-                <a:ea typeface="微軟正黑體" pitchFamily="34" charset="-120"/>
-              </a:rPr>
-              <a:t>  使</a:t>
+              <a:t>   使</a:t>
             </a:r>
             <a:r>
               <a:rPr lang="zh-TW" altLang="en-US" sz="5400" b="1" dirty="0">
@@ -3351,6 +3371,902 @@
               </a:solidFill>
               <a:latin typeface="微軟正黑體" pitchFamily="34" charset="-120"/>
               <a:ea typeface="微軟正黑體" pitchFamily="34" charset="-120"/>
+            </a:endParaRPr>
+          </a:p>
+        </p:txBody>
+      </p:sp>
+    </p:spTree>
+  </p:cSld>
+  <p:clrMapOvr>
+    <a:masterClrMapping/>
+  </p:clrMapOvr>
+</p:sld>
+</file>
+
+<file path=ppt/slides/slide10.xml><?xml version="1.0" encoding="utf-8"?>
+<p:sld xmlns:a="http://schemas.openxmlformats.org/drawingml/2006/main" xmlns:r="http://schemas.openxmlformats.org/officeDocument/2006/relationships" xmlns:p="http://schemas.openxmlformats.org/presentationml/2006/main">
+  <p:cSld>
+    <p:spTree>
+      <p:nvGrpSpPr>
+        <p:cNvPr id="1" name=""/>
+        <p:cNvGrpSpPr/>
+        <p:nvPr/>
+      </p:nvGrpSpPr>
+      <p:grpSpPr>
+        <a:xfrm>
+          <a:off x="0" y="0"/>
+          <a:ext cx="0" cy="0"/>
+          <a:chOff x="0" y="0"/>
+          <a:chExt cx="0" cy="0"/>
+        </a:xfrm>
+      </p:grpSpPr>
+      <p:sp>
+        <p:nvSpPr>
+          <p:cNvPr id="4" name="標題 3"/>
+          <p:cNvSpPr>
+            <a:spLocks noGrp="1"/>
+          </p:cNvSpPr>
+          <p:nvPr>
+            <p:ph type="title"/>
+          </p:nvPr>
+        </p:nvSpPr>
+        <p:spPr/>
+        <p:txBody>
+          <a:bodyPr>
+            <a:normAutofit/>
+          </a:bodyPr>
+          <a:lstStyle/>
+          <a:p>
+            <a:r>
+              <a:rPr lang="zh-TW" altLang="en-US" b="1" dirty="0">
+                <a:solidFill>
+                  <a:srgbClr val="660033"/>
+                </a:solidFill>
+                <a:latin typeface="微軟正黑體" pitchFamily="34" charset="-120"/>
+                <a:ea typeface="微軟正黑體" pitchFamily="34" charset="-120"/>
+              </a:rPr>
+              <a:t>因祂</a:t>
+            </a:r>
+            <a:r>
+              <a:rPr lang="zh-TW" altLang="en-US" b="1" dirty="0" smtClean="0">
+                <a:solidFill>
+                  <a:srgbClr val="660033"/>
+                </a:solidFill>
+                <a:latin typeface="微軟正黑體" pitchFamily="34" charset="-120"/>
+                <a:ea typeface="微軟正黑體" pitchFamily="34" charset="-120"/>
+              </a:rPr>
+              <a:t>活著</a:t>
+            </a:r>
+            <a:r>
+              <a:rPr lang="zh-TW" altLang="en-US" b="1" dirty="0" smtClean="0">
+                <a:latin typeface="微軟正黑體" pitchFamily="34" charset="-120"/>
+                <a:ea typeface="微軟正黑體" pitchFamily="34" charset="-120"/>
+              </a:rPr>
+              <a:t>    </a:t>
+            </a:r>
+            <a:r>
+              <a:rPr lang="en-US" b="1" dirty="0" err="1" smtClean="0">
+                <a:solidFill>
+                  <a:srgbClr val="002060"/>
+                </a:solidFill>
+              </a:rPr>
+              <a:t>Vì</a:t>
+            </a:r>
+            <a:r>
+              <a:rPr lang="en-US" b="1" dirty="0" smtClean="0">
+                <a:solidFill>
+                  <a:srgbClr val="002060"/>
+                </a:solidFill>
+              </a:rPr>
+              <a:t> </a:t>
+            </a:r>
+            <a:r>
+              <a:rPr lang="en-US" b="1" dirty="0" err="1">
+                <a:solidFill>
+                  <a:srgbClr val="002060"/>
+                </a:solidFill>
+              </a:rPr>
+              <a:t>Giê-su</a:t>
+            </a:r>
+            <a:r>
+              <a:rPr lang="en-US" b="1" dirty="0">
+                <a:solidFill>
+                  <a:srgbClr val="002060"/>
+                </a:solidFill>
+              </a:rPr>
+              <a:t> </a:t>
+            </a:r>
+            <a:r>
+              <a:rPr lang="en-US" b="1" dirty="0" err="1" smtClean="0">
+                <a:solidFill>
+                  <a:srgbClr val="002060"/>
+                </a:solidFill>
+              </a:rPr>
+              <a:t>Sống</a:t>
+            </a:r>
+            <a:endParaRPr lang="zh-TW" altLang="en-US" b="1" dirty="0">
+              <a:solidFill>
+                <a:srgbClr val="002060"/>
+              </a:solidFill>
+            </a:endParaRPr>
+          </a:p>
+        </p:txBody>
+      </p:sp>
+      <p:sp>
+        <p:nvSpPr>
+          <p:cNvPr id="5" name="內容版面配置區 4"/>
+          <p:cNvSpPr>
+            <a:spLocks noGrp="1"/>
+          </p:cNvSpPr>
+          <p:nvPr>
+            <p:ph idx="1"/>
+          </p:nvPr>
+        </p:nvSpPr>
+        <p:spPr>
+          <a:xfrm>
+            <a:off x="457200" y="1600201"/>
+            <a:ext cx="8258204" cy="1971676"/>
+          </a:xfrm>
+        </p:spPr>
+        <p:txBody>
+          <a:bodyPr>
+            <a:normAutofit/>
+          </a:bodyPr>
+          <a:lstStyle/>
+          <a:p>
+            <a:pPr algn="ctr">
+              <a:buNone/>
+            </a:pPr>
+            <a:r>
+              <a:rPr lang="zh-TW" altLang="en-US" sz="5400" b="1" dirty="0">
+                <a:solidFill>
+                  <a:srgbClr val="660033"/>
+                </a:solidFill>
+                <a:latin typeface="微軟正黑體" pitchFamily="34" charset="-120"/>
+                <a:ea typeface="微軟正黑體" pitchFamily="34" charset="-120"/>
+              </a:rPr>
+              <a:t>因祂活著 我能面對明天</a:t>
+            </a:r>
+          </a:p>
+          <a:p>
+            <a:pPr algn="ctr">
+              <a:buNone/>
+            </a:pPr>
+            <a:r>
+              <a:rPr lang="zh-TW" altLang="en-US" sz="5400" b="1" dirty="0">
+                <a:solidFill>
+                  <a:srgbClr val="660033"/>
+                </a:solidFill>
+                <a:latin typeface="微軟正黑體" pitchFamily="34" charset="-120"/>
+                <a:ea typeface="微軟正黑體" pitchFamily="34" charset="-120"/>
+              </a:rPr>
+              <a:t>因祂活著 不再懼怕</a:t>
+            </a:r>
+          </a:p>
+        </p:txBody>
+      </p:sp>
+      <p:sp>
+        <p:nvSpPr>
+          <p:cNvPr id="6" name="內容版面配置區 4"/>
+          <p:cNvSpPr txBox="1">
+            <a:spLocks/>
+          </p:cNvSpPr>
+          <p:nvPr/>
+        </p:nvSpPr>
+        <p:spPr>
+          <a:xfrm>
+            <a:off x="0" y="3929066"/>
+            <a:ext cx="9144000" cy="2928934"/>
+          </a:xfrm>
+          <a:prstGeom prst="rect">
+            <a:avLst/>
+          </a:prstGeom>
+        </p:spPr>
+        <p:txBody>
+          <a:bodyPr vert="horz" lIns="91440" tIns="45720" rIns="91440" bIns="45720" rtlCol="0">
+            <a:normAutofit/>
+          </a:bodyPr>
+          <a:lstStyle/>
+          <a:p>
+            <a:pPr marL="342900" indent="-342900" algn="ctr">
+              <a:spcBef>
+                <a:spcPct val="20000"/>
+              </a:spcBef>
+            </a:pPr>
+            <a:r>
+              <a:rPr lang="vi-VN" sz="3600" dirty="0">
+                <a:solidFill>
+                  <a:srgbClr val="002060"/>
+                </a:solidFill>
+              </a:rPr>
+              <a:t>Vì Giê-su </a:t>
+            </a:r>
+            <a:r>
+              <a:rPr lang="vi-VN" sz="3600" dirty="0" smtClean="0">
+                <a:solidFill>
+                  <a:srgbClr val="002060"/>
+                </a:solidFill>
+              </a:rPr>
+              <a:t>sống</a:t>
+            </a:r>
+            <a:r>
+              <a:rPr lang="en-US" sz="3600" dirty="0" smtClean="0">
+                <a:solidFill>
+                  <a:srgbClr val="002060"/>
+                </a:solidFill>
+              </a:rPr>
+              <a:t> </a:t>
+            </a:r>
+            <a:r>
+              <a:rPr lang="vi-VN" sz="3600" dirty="0" smtClean="0">
+                <a:solidFill>
+                  <a:srgbClr val="002060"/>
+                </a:solidFill>
+              </a:rPr>
+              <a:t>tôi </a:t>
+            </a:r>
+            <a:r>
+              <a:rPr lang="vi-VN" sz="3600" dirty="0">
+                <a:solidFill>
+                  <a:srgbClr val="002060"/>
+                </a:solidFill>
+              </a:rPr>
+              <a:t>bước đi với hi </a:t>
+            </a:r>
+            <a:r>
+              <a:rPr lang="vi-VN" sz="3600" dirty="0" smtClean="0">
+                <a:solidFill>
+                  <a:srgbClr val="002060"/>
+                </a:solidFill>
+              </a:rPr>
+              <a:t>vọng</a:t>
+            </a:r>
+            <a:endParaRPr lang="en-US" sz="3600" dirty="0" smtClean="0">
+              <a:solidFill>
+                <a:srgbClr val="002060"/>
+              </a:solidFill>
+            </a:endParaRPr>
+          </a:p>
+          <a:p>
+            <a:pPr marL="342900" indent="-342900" algn="ctr">
+              <a:spcBef>
+                <a:spcPct val="20000"/>
+              </a:spcBef>
+            </a:pPr>
+            <a:r>
+              <a:rPr lang="vi-VN" sz="3600" dirty="0" smtClean="0">
+                <a:solidFill>
+                  <a:srgbClr val="002060"/>
+                </a:solidFill>
+              </a:rPr>
+              <a:t>Bóng </a:t>
+            </a:r>
+            <a:r>
+              <a:rPr lang="vi-VN" sz="3600" dirty="0">
+                <a:solidFill>
+                  <a:srgbClr val="002060"/>
+                </a:solidFill>
+              </a:rPr>
+              <a:t>đêm xa </a:t>
+            </a:r>
+            <a:r>
+              <a:rPr lang="vi-VN" sz="3600" dirty="0" smtClean="0">
+                <a:solidFill>
+                  <a:srgbClr val="002060"/>
+                </a:solidFill>
+              </a:rPr>
+              <a:t>dần</a:t>
+            </a:r>
+            <a:r>
+              <a:rPr lang="en-US" sz="3600" dirty="0" smtClean="0">
+                <a:solidFill>
+                  <a:srgbClr val="002060"/>
+                </a:solidFill>
+              </a:rPr>
+              <a:t> </a:t>
+            </a:r>
+            <a:r>
+              <a:rPr lang="vi-VN" sz="3600" dirty="0" smtClean="0">
+                <a:solidFill>
+                  <a:srgbClr val="002060"/>
+                </a:solidFill>
+              </a:rPr>
+              <a:t>lòng </a:t>
+            </a:r>
+            <a:r>
+              <a:rPr lang="vi-VN" sz="3600" dirty="0">
+                <a:solidFill>
+                  <a:srgbClr val="002060"/>
+                </a:solidFill>
+              </a:rPr>
+              <a:t>luôn vững tin</a:t>
+            </a:r>
+            <a:endParaRPr lang="zh-TW" altLang="en-US" sz="3600" dirty="0" smtClean="0">
+              <a:solidFill>
+                <a:srgbClr val="002060"/>
+              </a:solidFill>
+            </a:endParaRPr>
+          </a:p>
+        </p:txBody>
+      </p:sp>
+    </p:spTree>
+  </p:cSld>
+  <p:clrMapOvr>
+    <a:masterClrMapping/>
+  </p:clrMapOvr>
+</p:sld>
+</file>
+
+<file path=ppt/slides/slide11.xml><?xml version="1.0" encoding="utf-8"?>
+<p:sld xmlns:a="http://schemas.openxmlformats.org/drawingml/2006/main" xmlns:r="http://schemas.openxmlformats.org/officeDocument/2006/relationships" xmlns:p="http://schemas.openxmlformats.org/presentationml/2006/main">
+  <p:cSld>
+    <p:spTree>
+      <p:nvGrpSpPr>
+        <p:cNvPr id="1" name=""/>
+        <p:cNvGrpSpPr/>
+        <p:nvPr/>
+      </p:nvGrpSpPr>
+      <p:grpSpPr>
+        <a:xfrm>
+          <a:off x="0" y="0"/>
+          <a:ext cx="0" cy="0"/>
+          <a:chOff x="0" y="0"/>
+          <a:chExt cx="0" cy="0"/>
+        </a:xfrm>
+      </p:grpSpPr>
+      <p:sp>
+        <p:nvSpPr>
+          <p:cNvPr id="4" name="標題 3"/>
+          <p:cNvSpPr>
+            <a:spLocks noGrp="1"/>
+          </p:cNvSpPr>
+          <p:nvPr>
+            <p:ph type="title"/>
+          </p:nvPr>
+        </p:nvSpPr>
+        <p:spPr/>
+        <p:txBody>
+          <a:bodyPr>
+            <a:normAutofit/>
+          </a:bodyPr>
+          <a:lstStyle/>
+          <a:p>
+            <a:r>
+              <a:rPr lang="zh-TW" altLang="en-US" b="1" dirty="0">
+                <a:solidFill>
+                  <a:srgbClr val="660033"/>
+                </a:solidFill>
+                <a:latin typeface="微軟正黑體" pitchFamily="34" charset="-120"/>
+                <a:ea typeface="微軟正黑體" pitchFamily="34" charset="-120"/>
+              </a:rPr>
+              <a:t>因祂</a:t>
+            </a:r>
+            <a:r>
+              <a:rPr lang="zh-TW" altLang="en-US" b="1" dirty="0" smtClean="0">
+                <a:solidFill>
+                  <a:srgbClr val="660033"/>
+                </a:solidFill>
+                <a:latin typeface="微軟正黑體" pitchFamily="34" charset="-120"/>
+                <a:ea typeface="微軟正黑體" pitchFamily="34" charset="-120"/>
+              </a:rPr>
+              <a:t>活著</a:t>
+            </a:r>
+            <a:r>
+              <a:rPr lang="zh-TW" altLang="en-US" b="1" dirty="0" smtClean="0">
+                <a:latin typeface="微軟正黑體" pitchFamily="34" charset="-120"/>
+                <a:ea typeface="微軟正黑體" pitchFamily="34" charset="-120"/>
+              </a:rPr>
+              <a:t>    </a:t>
+            </a:r>
+            <a:r>
+              <a:rPr lang="en-US" b="1" dirty="0" err="1" smtClean="0">
+                <a:solidFill>
+                  <a:srgbClr val="002060"/>
+                </a:solidFill>
+              </a:rPr>
+              <a:t>Vì</a:t>
+            </a:r>
+            <a:r>
+              <a:rPr lang="en-US" b="1" dirty="0" smtClean="0">
+                <a:solidFill>
+                  <a:srgbClr val="002060"/>
+                </a:solidFill>
+              </a:rPr>
+              <a:t> </a:t>
+            </a:r>
+            <a:r>
+              <a:rPr lang="en-US" b="1" dirty="0" err="1">
+                <a:solidFill>
+                  <a:srgbClr val="002060"/>
+                </a:solidFill>
+              </a:rPr>
+              <a:t>Giê-su</a:t>
+            </a:r>
+            <a:r>
+              <a:rPr lang="en-US" b="1" dirty="0">
+                <a:solidFill>
+                  <a:srgbClr val="002060"/>
+                </a:solidFill>
+              </a:rPr>
+              <a:t> </a:t>
+            </a:r>
+            <a:r>
+              <a:rPr lang="en-US" b="1" dirty="0" err="1" smtClean="0">
+                <a:solidFill>
+                  <a:srgbClr val="002060"/>
+                </a:solidFill>
+              </a:rPr>
+              <a:t>Sống</a:t>
+            </a:r>
+            <a:endParaRPr lang="zh-TW" altLang="en-US" b="1" dirty="0">
+              <a:solidFill>
+                <a:srgbClr val="002060"/>
+              </a:solidFill>
+            </a:endParaRPr>
+          </a:p>
+        </p:txBody>
+      </p:sp>
+      <p:sp>
+        <p:nvSpPr>
+          <p:cNvPr id="5" name="內容版面配置區 4"/>
+          <p:cNvSpPr>
+            <a:spLocks noGrp="1"/>
+          </p:cNvSpPr>
+          <p:nvPr>
+            <p:ph idx="1"/>
+          </p:nvPr>
+        </p:nvSpPr>
+        <p:spPr>
+          <a:xfrm>
+            <a:off x="0" y="1600201"/>
+            <a:ext cx="9144000" cy="1971676"/>
+          </a:xfrm>
+        </p:spPr>
+        <p:txBody>
+          <a:bodyPr>
+            <a:noAutofit/>
+          </a:bodyPr>
+          <a:lstStyle/>
+          <a:p>
+            <a:pPr algn="ctr">
+              <a:buNone/>
+            </a:pPr>
+            <a:r>
+              <a:rPr lang="zh-TW" altLang="en-US" sz="5400" b="1" dirty="0">
+                <a:solidFill>
+                  <a:srgbClr val="660033"/>
+                </a:solidFill>
+                <a:latin typeface="微軟正黑體" pitchFamily="34" charset="-120"/>
+                <a:ea typeface="微軟正黑體" pitchFamily="34" charset="-120"/>
+              </a:rPr>
+              <a:t>我深知道 祂掌管明天</a:t>
+            </a:r>
+          </a:p>
+          <a:p>
+            <a:pPr algn="ctr">
+              <a:buNone/>
+            </a:pPr>
+            <a:r>
+              <a:rPr lang="zh-TW" altLang="en-US" sz="5400" b="1" dirty="0">
+                <a:solidFill>
+                  <a:srgbClr val="660033"/>
+                </a:solidFill>
+                <a:latin typeface="微軟正黑體" pitchFamily="34" charset="-120"/>
+                <a:ea typeface="微軟正黑體" pitchFamily="34" charset="-120"/>
+              </a:rPr>
+              <a:t>生命充滿了</a:t>
+            </a:r>
+            <a:r>
+              <a:rPr lang="zh-TW" altLang="en-US" sz="5400" b="1" dirty="0" smtClean="0">
+                <a:solidFill>
+                  <a:srgbClr val="660033"/>
+                </a:solidFill>
+                <a:latin typeface="微軟正黑體" pitchFamily="34" charset="-120"/>
+                <a:ea typeface="微軟正黑體" pitchFamily="34" charset="-120"/>
+              </a:rPr>
+              <a:t>希望  只</a:t>
+            </a:r>
+            <a:r>
+              <a:rPr lang="zh-TW" altLang="en-US" sz="5400" b="1" dirty="0">
+                <a:solidFill>
+                  <a:srgbClr val="660033"/>
+                </a:solidFill>
+                <a:latin typeface="微軟正黑體" pitchFamily="34" charset="-120"/>
+                <a:ea typeface="微軟正黑體" pitchFamily="34" charset="-120"/>
+              </a:rPr>
+              <a:t>因祂活著</a:t>
+            </a:r>
+          </a:p>
+        </p:txBody>
+      </p:sp>
+      <p:sp>
+        <p:nvSpPr>
+          <p:cNvPr id="6" name="內容版面配置區 4"/>
+          <p:cNvSpPr txBox="1">
+            <a:spLocks/>
+          </p:cNvSpPr>
+          <p:nvPr/>
+        </p:nvSpPr>
+        <p:spPr>
+          <a:xfrm>
+            <a:off x="0" y="3929066"/>
+            <a:ext cx="9144000" cy="2928934"/>
+          </a:xfrm>
+          <a:prstGeom prst="rect">
+            <a:avLst/>
+          </a:prstGeom>
+        </p:spPr>
+        <p:txBody>
+          <a:bodyPr vert="horz" lIns="91440" tIns="45720" rIns="91440" bIns="45720" rtlCol="0">
+            <a:normAutofit/>
+          </a:bodyPr>
+          <a:lstStyle/>
+          <a:p>
+            <a:pPr marL="342900" lvl="0" indent="-342900" algn="ctr">
+              <a:spcBef>
+                <a:spcPct val="20000"/>
+              </a:spcBef>
+            </a:pPr>
+            <a:r>
+              <a:rPr lang="en-US" sz="3600" dirty="0" err="1">
+                <a:solidFill>
+                  <a:srgbClr val="002060"/>
+                </a:solidFill>
+              </a:rPr>
+              <a:t>Vì</a:t>
+            </a:r>
+            <a:r>
+              <a:rPr lang="en-US" sz="3600" dirty="0">
+                <a:solidFill>
+                  <a:srgbClr val="002060"/>
+                </a:solidFill>
+              </a:rPr>
+              <a:t> </a:t>
+            </a:r>
+            <a:r>
+              <a:rPr lang="en-US" sz="3600" dirty="0" err="1">
+                <a:solidFill>
+                  <a:srgbClr val="002060"/>
+                </a:solidFill>
+              </a:rPr>
+              <a:t>tôi</a:t>
+            </a:r>
+            <a:r>
+              <a:rPr lang="en-US" sz="3600" dirty="0">
+                <a:solidFill>
+                  <a:srgbClr val="002060"/>
+                </a:solidFill>
+              </a:rPr>
+              <a:t> </a:t>
+            </a:r>
+            <a:r>
+              <a:rPr lang="en-US" sz="3600" dirty="0" err="1">
+                <a:solidFill>
+                  <a:srgbClr val="002060"/>
+                </a:solidFill>
+              </a:rPr>
+              <a:t>biết</a:t>
+            </a:r>
+            <a:r>
+              <a:rPr lang="en-US" sz="3600" dirty="0">
+                <a:solidFill>
+                  <a:srgbClr val="002060"/>
+                </a:solidFill>
+              </a:rPr>
+              <a:t> </a:t>
+            </a:r>
+            <a:r>
+              <a:rPr lang="en-US" sz="3600" dirty="0" err="1">
+                <a:solidFill>
+                  <a:srgbClr val="002060"/>
+                </a:solidFill>
+              </a:rPr>
+              <a:t>rõ</a:t>
+            </a:r>
+            <a:r>
+              <a:rPr lang="en-US" sz="3600" dirty="0">
+                <a:solidFill>
+                  <a:srgbClr val="002060"/>
+                </a:solidFill>
+              </a:rPr>
+              <a:t> </a:t>
+            </a:r>
+            <a:r>
+              <a:rPr lang="en-US" sz="3600" dirty="0" err="1">
+                <a:solidFill>
+                  <a:srgbClr val="002060"/>
+                </a:solidFill>
+              </a:rPr>
+              <a:t>Chúa</a:t>
+            </a:r>
+            <a:r>
+              <a:rPr lang="en-US" sz="3600" dirty="0">
+                <a:solidFill>
+                  <a:srgbClr val="002060"/>
+                </a:solidFill>
+              </a:rPr>
+              <a:t> </a:t>
+            </a:r>
+            <a:r>
+              <a:rPr lang="en-US" sz="3600" dirty="0" err="1" smtClean="0">
+                <a:solidFill>
+                  <a:srgbClr val="002060"/>
+                </a:solidFill>
+              </a:rPr>
+              <a:t>sống</a:t>
+            </a:r>
+            <a:endParaRPr lang="en-US" sz="3600" dirty="0">
+              <a:solidFill>
+                <a:srgbClr val="002060"/>
+              </a:solidFill>
+            </a:endParaRPr>
+          </a:p>
+          <a:p>
+            <a:pPr marL="342900" lvl="0" indent="-342900" algn="ctr">
+              <a:spcBef>
+                <a:spcPct val="20000"/>
+              </a:spcBef>
+            </a:pPr>
+            <a:r>
+              <a:rPr lang="en-US" sz="3600" dirty="0" err="1" smtClean="0">
+                <a:solidFill>
+                  <a:srgbClr val="002060"/>
+                </a:solidFill>
+              </a:rPr>
+              <a:t>uy</a:t>
+            </a:r>
+            <a:r>
+              <a:rPr lang="en-US" sz="3600" dirty="0" smtClean="0">
+                <a:solidFill>
+                  <a:srgbClr val="002060"/>
+                </a:solidFill>
+              </a:rPr>
+              <a:t> </a:t>
+            </a:r>
+            <a:r>
+              <a:rPr lang="en-US" sz="3600" dirty="0" err="1">
+                <a:solidFill>
+                  <a:srgbClr val="002060"/>
+                </a:solidFill>
+              </a:rPr>
+              <a:t>quyền</a:t>
+            </a:r>
+            <a:r>
+              <a:rPr lang="en-US" sz="3600" dirty="0">
+                <a:solidFill>
+                  <a:srgbClr val="002060"/>
+                </a:solidFill>
+              </a:rPr>
+              <a:t> </a:t>
+            </a:r>
+            <a:r>
+              <a:rPr lang="en-US" sz="3600" dirty="0" err="1">
+                <a:solidFill>
+                  <a:srgbClr val="002060"/>
+                </a:solidFill>
+              </a:rPr>
+              <a:t>trên</a:t>
+            </a:r>
+            <a:r>
+              <a:rPr lang="en-US" sz="3600" dirty="0">
+                <a:solidFill>
+                  <a:srgbClr val="002060"/>
+                </a:solidFill>
+              </a:rPr>
+              <a:t> </a:t>
+            </a:r>
+            <a:r>
+              <a:rPr lang="en-US" sz="3600" dirty="0" err="1">
+                <a:solidFill>
+                  <a:srgbClr val="002060"/>
+                </a:solidFill>
+              </a:rPr>
+              <a:t>khắp</a:t>
+            </a:r>
+            <a:r>
+              <a:rPr lang="en-US" sz="3600" dirty="0">
+                <a:solidFill>
+                  <a:srgbClr val="002060"/>
+                </a:solidFill>
+              </a:rPr>
+              <a:t> </a:t>
+            </a:r>
+            <a:r>
+              <a:rPr lang="en-US" sz="3600" dirty="0" err="1" smtClean="0">
+                <a:solidFill>
+                  <a:srgbClr val="002060"/>
+                </a:solidFill>
+              </a:rPr>
+              <a:t>trời</a:t>
+            </a:r>
+            <a:endParaRPr lang="en-US" sz="3600" dirty="0" smtClean="0">
+              <a:solidFill>
+                <a:srgbClr val="002060"/>
+              </a:solidFill>
+            </a:endParaRPr>
+          </a:p>
+          <a:p>
+            <a:pPr marL="342900" lvl="0" indent="-342900" algn="ctr">
+              <a:spcBef>
+                <a:spcPct val="20000"/>
+              </a:spcBef>
+            </a:pPr>
+            <a:r>
+              <a:rPr lang="en-US" sz="3600" dirty="0" err="1" smtClean="0">
+                <a:solidFill>
+                  <a:srgbClr val="002060"/>
+                </a:solidFill>
+              </a:rPr>
+              <a:t>Vì</a:t>
+            </a:r>
+            <a:r>
+              <a:rPr lang="en-US" sz="3600" dirty="0" smtClean="0">
+                <a:solidFill>
+                  <a:srgbClr val="002060"/>
+                </a:solidFill>
+              </a:rPr>
+              <a:t> </a:t>
+            </a:r>
+            <a:r>
+              <a:rPr lang="en-US" sz="3600" dirty="0" err="1">
+                <a:solidFill>
+                  <a:srgbClr val="002060"/>
+                </a:solidFill>
+              </a:rPr>
+              <a:t>Giê-su</a:t>
+            </a:r>
+            <a:r>
+              <a:rPr lang="en-US" sz="3600" dirty="0">
+                <a:solidFill>
+                  <a:srgbClr val="002060"/>
+                </a:solidFill>
+              </a:rPr>
+              <a:t> </a:t>
+            </a:r>
+            <a:r>
+              <a:rPr lang="en-US" sz="3600" dirty="0" err="1">
+                <a:solidFill>
+                  <a:srgbClr val="002060"/>
+                </a:solidFill>
+              </a:rPr>
+              <a:t>sống</a:t>
+            </a:r>
+            <a:r>
+              <a:rPr lang="en-US" sz="3600" dirty="0">
+                <a:solidFill>
+                  <a:srgbClr val="002060"/>
+                </a:solidFill>
+              </a:rPr>
+              <a:t> </a:t>
+            </a:r>
+            <a:r>
+              <a:rPr lang="en-US" sz="3600" dirty="0" err="1">
+                <a:solidFill>
+                  <a:srgbClr val="002060"/>
+                </a:solidFill>
+              </a:rPr>
+              <a:t>luôn</a:t>
+            </a:r>
+            <a:r>
+              <a:rPr lang="en-US" sz="3600" dirty="0">
+                <a:solidFill>
+                  <a:srgbClr val="002060"/>
+                </a:solidFill>
+              </a:rPr>
+              <a:t> </a:t>
+            </a:r>
+            <a:r>
+              <a:rPr lang="en-US" sz="3600" dirty="0" err="1">
+                <a:solidFill>
+                  <a:srgbClr val="002060"/>
+                </a:solidFill>
+              </a:rPr>
+              <a:t>với</a:t>
+            </a:r>
+            <a:r>
+              <a:rPr lang="en-US" sz="3600" dirty="0">
+                <a:solidFill>
+                  <a:srgbClr val="002060"/>
+                </a:solidFill>
+              </a:rPr>
+              <a:t> </a:t>
+            </a:r>
+            <a:r>
+              <a:rPr lang="en-US" sz="3600" dirty="0" err="1" smtClean="0">
+                <a:solidFill>
+                  <a:srgbClr val="002060"/>
+                </a:solidFill>
+              </a:rPr>
+              <a:t>tôi</a:t>
+            </a:r>
+            <a:endParaRPr lang="en-US" sz="3600" dirty="0" smtClean="0">
+              <a:solidFill>
+                <a:srgbClr val="002060"/>
+              </a:solidFill>
+            </a:endParaRPr>
+          </a:p>
+          <a:p>
+            <a:pPr marL="342900" lvl="0" indent="-342900" algn="ctr">
+              <a:spcBef>
+                <a:spcPct val="20000"/>
+              </a:spcBef>
+            </a:pPr>
+            <a:r>
+              <a:rPr lang="en-US" sz="3600" dirty="0" err="1" smtClean="0">
+                <a:solidFill>
+                  <a:srgbClr val="002060"/>
+                </a:solidFill>
+              </a:rPr>
+              <a:t>tôi</a:t>
+            </a:r>
+            <a:r>
+              <a:rPr lang="en-US" sz="3600" dirty="0" smtClean="0">
+                <a:solidFill>
+                  <a:srgbClr val="002060"/>
+                </a:solidFill>
+              </a:rPr>
+              <a:t> </a:t>
+            </a:r>
+            <a:r>
+              <a:rPr lang="en-US" sz="3600" dirty="0" err="1">
+                <a:solidFill>
+                  <a:srgbClr val="002060"/>
+                </a:solidFill>
+              </a:rPr>
+              <a:t>vui</a:t>
+            </a:r>
+            <a:r>
+              <a:rPr lang="en-US" sz="3600" dirty="0">
+                <a:solidFill>
+                  <a:srgbClr val="002060"/>
+                </a:solidFill>
+              </a:rPr>
+              <a:t> </a:t>
+            </a:r>
+            <a:r>
+              <a:rPr lang="en-US" sz="3600" dirty="0" err="1">
+                <a:solidFill>
+                  <a:srgbClr val="002060"/>
+                </a:solidFill>
+              </a:rPr>
+              <a:t>sống</a:t>
+            </a:r>
+            <a:r>
+              <a:rPr lang="en-US" sz="3600" dirty="0">
+                <a:solidFill>
+                  <a:srgbClr val="002060"/>
+                </a:solidFill>
+              </a:rPr>
+              <a:t> </a:t>
+            </a:r>
+            <a:r>
+              <a:rPr lang="en-US" sz="3600" dirty="0" err="1">
+                <a:solidFill>
+                  <a:srgbClr val="002060"/>
+                </a:solidFill>
+              </a:rPr>
+              <a:t>trong</a:t>
+            </a:r>
+            <a:r>
+              <a:rPr lang="en-US" sz="3600" dirty="0">
+                <a:solidFill>
+                  <a:srgbClr val="002060"/>
+                </a:solidFill>
+              </a:rPr>
+              <a:t> </a:t>
+            </a:r>
+            <a:r>
+              <a:rPr lang="en-US" sz="3600" dirty="0" err="1">
+                <a:solidFill>
+                  <a:srgbClr val="002060"/>
+                </a:solidFill>
+              </a:rPr>
+              <a:t>Ngài</a:t>
+            </a:r>
+            <a:endParaRPr lang="zh-TW" altLang="en-US" sz="3600" dirty="0" smtClean="0">
+              <a:solidFill>
+                <a:srgbClr val="002060"/>
+              </a:solidFill>
             </a:endParaRPr>
           </a:p>
         </p:txBody>
@@ -3452,27 +4368,7 @@
                 <a:latin typeface="微軟正黑體" pitchFamily="34" charset="-120"/>
                 <a:ea typeface="微軟正黑體" pitchFamily="34" charset="-120"/>
               </a:rPr>
-              <a:t>因祂</a:t>
-            </a:r>
-            <a:r>
-              <a:rPr lang="zh-TW" altLang="en-US" sz="5400" b="1" dirty="0" smtClean="0">
-                <a:solidFill>
-                  <a:srgbClr val="002060"/>
-                </a:solidFill>
-                <a:latin typeface="微軟正黑體" pitchFamily="34" charset="-120"/>
-                <a:ea typeface="微軟正黑體" pitchFamily="34" charset="-120"/>
-              </a:rPr>
-              <a:t>活著   我</a:t>
-            </a:r>
-            <a:r>
-              <a:rPr lang="zh-TW" altLang="en-US" sz="5400" b="1" dirty="0" smtClean="0">
-                <a:solidFill>
-                  <a:srgbClr val="002060"/>
-                </a:solidFill>
-                <a:latin typeface="微軟正黑體" pitchFamily="34" charset="-120"/>
-                <a:ea typeface="微軟正黑體" pitchFamily="34" charset="-120"/>
-              </a:rPr>
-              <a:t>能面對明天</a:t>
+              <a:t>因祂活著   我能面對明天</a:t>
             </a:r>
             <a:endParaRPr lang="en-US" altLang="zh-TW" sz="5400" b="1" dirty="0" smtClean="0">
               <a:solidFill>
@@ -3494,17 +4390,7 @@
                 <a:latin typeface="微軟正黑體" pitchFamily="34" charset="-120"/>
                 <a:ea typeface="微軟正黑體" pitchFamily="34" charset="-120"/>
               </a:rPr>
-              <a:t>因祂</a:t>
-            </a:r>
-            <a:r>
-              <a:rPr lang="zh-TW" altLang="en-US" sz="5400" b="1" dirty="0" smtClean="0">
-                <a:solidFill>
-                  <a:srgbClr val="002060"/>
-                </a:solidFill>
-                <a:latin typeface="微軟正黑體" pitchFamily="34" charset="-120"/>
-                <a:ea typeface="微軟正黑體" pitchFamily="34" charset="-120"/>
-              </a:rPr>
-              <a:t>活著   不再懼怕</a:t>
+              <a:t>因祂活著   不再懼怕</a:t>
             </a:r>
             <a:endParaRPr lang="en-US" altLang="zh-TW" sz="5400" b="1" dirty="0" smtClean="0">
               <a:solidFill>
@@ -3526,27 +4412,7 @@
                 <a:latin typeface="微軟正黑體" pitchFamily="34" charset="-120"/>
                 <a:ea typeface="微軟正黑體" pitchFamily="34" charset="-120"/>
               </a:rPr>
-              <a:t>我深</a:t>
-            </a:r>
-            <a:r>
-              <a:rPr lang="zh-TW" altLang="en-US" sz="5400" b="1" dirty="0" smtClean="0">
-                <a:solidFill>
-                  <a:srgbClr val="002060"/>
-                </a:solidFill>
-                <a:latin typeface="微軟正黑體" pitchFamily="34" charset="-120"/>
-                <a:ea typeface="微軟正黑體" pitchFamily="34" charset="-120"/>
-              </a:rPr>
-              <a:t>知道   祂</a:t>
-            </a:r>
-            <a:r>
-              <a:rPr lang="zh-TW" altLang="en-US" sz="5400" b="1" dirty="0" smtClean="0">
-                <a:solidFill>
-                  <a:srgbClr val="002060"/>
-                </a:solidFill>
-                <a:latin typeface="微軟正黑體" pitchFamily="34" charset="-120"/>
-                <a:ea typeface="微軟正黑體" pitchFamily="34" charset="-120"/>
-              </a:rPr>
-              <a:t>掌管明天</a:t>
+              <a:t>我深知道   祂掌管明天</a:t>
             </a:r>
             <a:endParaRPr lang="en-US" altLang="zh-TW" sz="5400" b="1" dirty="0" smtClean="0">
               <a:solidFill>
@@ -3568,17 +4434,7 @@
                 <a:latin typeface="微軟正黑體" pitchFamily="34" charset="-120"/>
                 <a:ea typeface="微軟正黑體" pitchFamily="34" charset="-120"/>
               </a:rPr>
-              <a:t>生命充滿了</a:t>
-            </a:r>
-            <a:r>
-              <a:rPr lang="zh-TW" altLang="en-US" sz="5400" b="1" dirty="0" smtClean="0">
-                <a:solidFill>
-                  <a:srgbClr val="002060"/>
-                </a:solidFill>
-                <a:latin typeface="微軟正黑體" pitchFamily="34" charset="-120"/>
-                <a:ea typeface="微軟正黑體" pitchFamily="34" charset="-120"/>
-              </a:rPr>
-              <a:t>希望   </a:t>
+              <a:t>生命充滿了希望   </a:t>
             </a:r>
             <a:endParaRPr lang="en-US" altLang="zh-TW" sz="5400" b="1" smtClean="0">
               <a:solidFill>
@@ -3610,25 +4466,8 @@
                 <a:latin typeface="微軟正黑體" pitchFamily="34" charset="-120"/>
                 <a:ea typeface="微軟正黑體" pitchFamily="34" charset="-120"/>
               </a:rPr>
-              <a:t>因祂</a:t>
-            </a:r>
-            <a:r>
-              <a:rPr lang="zh-TW" altLang="en-US" sz="5400" b="1" dirty="0" smtClean="0">
-                <a:solidFill>
-                  <a:srgbClr val="002060"/>
-                </a:solidFill>
-                <a:latin typeface="微軟正黑體" pitchFamily="34" charset="-120"/>
-                <a:ea typeface="微軟正黑體" pitchFamily="34" charset="-120"/>
-              </a:rPr>
-              <a:t>活著</a:t>
-            </a:r>
-            <a:endParaRPr lang="zh-TW" altLang="en-US" sz="5400" b="1" dirty="0" smtClean="0">
-              <a:solidFill>
-                <a:srgbClr val="002060"/>
-              </a:solidFill>
-              <a:latin typeface="微軟正黑體" pitchFamily="34" charset="-120"/>
-              <a:ea typeface="微軟正黑體" pitchFamily="34" charset="-120"/>
-            </a:endParaRPr>
+              <a:t>因祂活著</a:t>
+            </a:r>
           </a:p>
         </p:txBody>
       </p:sp>
@@ -3643,6 +4482,14 @@
 <file path=ppt/slides/slide3.xml><?xml version="1.0" encoding="utf-8"?>
 <p:sld xmlns:a="http://schemas.openxmlformats.org/drawingml/2006/main" xmlns:r="http://schemas.openxmlformats.org/officeDocument/2006/relationships" xmlns:p="http://schemas.openxmlformats.org/presentationml/2006/main">
   <p:cSld>
+    <p:bg>
+      <p:bgPr>
+        <a:solidFill>
+          <a:schemeClr val="tx1"/>
+        </a:solidFill>
+        <a:effectLst/>
+      </p:bgPr>
+    </p:bg>
     <p:spTree>
       <p:nvGrpSpPr>
         <p:cNvPr id="1" name=""/>
@@ -3659,170 +4506,288 @@
       </p:grpSpPr>
       <p:sp>
         <p:nvSpPr>
-          <p:cNvPr id="2" name="標題 1"/>
-          <p:cNvSpPr>
-            <a:spLocks noGrp="1"/>
-          </p:cNvSpPr>
-          <p:nvPr>
-            <p:ph type="title"/>
-          </p:nvPr>
-        </p:nvSpPr>
-        <p:spPr/>
-        <p:txBody>
-          <a:bodyPr/>
-          <a:lstStyle/>
-          <a:p>
-            <a:r>
-              <a:rPr lang="zh-TW" altLang="en-US" b="1" dirty="0">
-                <a:solidFill>
-                  <a:srgbClr val="660033"/>
-                </a:solidFill>
-                <a:latin typeface="微軟正黑體" pitchFamily="34" charset="-120"/>
-                <a:ea typeface="微軟正黑體" pitchFamily="34" charset="-120"/>
-              </a:rPr>
-              <a:t>寶貴十架</a:t>
-            </a:r>
-          </a:p>
-        </p:txBody>
-      </p:sp>
-      <p:sp>
-        <p:nvSpPr>
-          <p:cNvPr id="3" name="內容版面配置區 2"/>
-          <p:cNvSpPr>
-            <a:spLocks noGrp="1"/>
-          </p:cNvSpPr>
-          <p:nvPr>
-            <p:ph idx="1"/>
-          </p:nvPr>
-        </p:nvSpPr>
-        <p:spPr/>
-        <p:txBody>
-          <a:bodyPr/>
-          <a:lstStyle/>
-          <a:p>
-            <a:pPr algn="ctr">
-              <a:buNone/>
-            </a:pPr>
-            <a:r>
-              <a:rPr lang="zh-TW" altLang="en-US" sz="5400" b="1" dirty="0">
-                <a:solidFill>
-                  <a:srgbClr val="660033"/>
-                </a:solidFill>
-                <a:latin typeface="微軟正黑體" pitchFamily="34" charset="-120"/>
-                <a:ea typeface="微軟正黑體" pitchFamily="34" charset="-120"/>
-              </a:rPr>
-              <a:t>主耶穌 我感謝你</a:t>
-            </a:r>
-          </a:p>
-          <a:p>
-            <a:pPr algn="ctr">
-              <a:buNone/>
-            </a:pPr>
-            <a:r>
-              <a:rPr lang="zh-TW" altLang="en-US" sz="5400" b="1" dirty="0">
-                <a:solidFill>
-                  <a:srgbClr val="660033"/>
-                </a:solidFill>
-                <a:latin typeface="微軟正黑體" pitchFamily="34" charset="-120"/>
-                <a:ea typeface="微軟正黑體" pitchFamily="34" charset="-120"/>
-              </a:rPr>
-              <a:t>你的身體 為我而捨</a:t>
-            </a:r>
-          </a:p>
-          <a:p>
-            <a:pPr algn="ctr">
-              <a:buNone/>
-            </a:pPr>
-            <a:r>
-              <a:rPr lang="zh-TW" altLang="en-US" sz="5400" b="1" dirty="0">
-                <a:solidFill>
-                  <a:srgbClr val="660033"/>
-                </a:solidFill>
-                <a:latin typeface="微軟正黑體" pitchFamily="34" charset="-120"/>
-                <a:ea typeface="微軟正黑體" pitchFamily="34" charset="-120"/>
-              </a:rPr>
-              <a:t>帶我出黑暗 </a:t>
-            </a:r>
-            <a:r>
-              <a:rPr lang="zh-TW" altLang="en-US" sz="5400" b="1" dirty="0" smtClean="0">
-                <a:solidFill>
-                  <a:srgbClr val="660033"/>
-                </a:solidFill>
-                <a:latin typeface="微軟正黑體" pitchFamily="34" charset="-120"/>
-                <a:ea typeface="微軟正黑體" pitchFamily="34" charset="-120"/>
-              </a:rPr>
-              <a:t>進</a:t>
-            </a:r>
-            <a:r>
-              <a:rPr lang="zh-CN" altLang="en-US" sz="5400" b="1" dirty="0" smtClean="0">
-                <a:solidFill>
-                  <a:srgbClr val="660033"/>
-                </a:solidFill>
-                <a:latin typeface="微軟正黑體" pitchFamily="34" charset="-120"/>
-                <a:ea typeface="微軟正黑體" pitchFamily="34" charset="-120"/>
-              </a:rPr>
-              <a:t>入</a:t>
-            </a:r>
-            <a:r>
-              <a:rPr lang="zh-TW" altLang="en-US" sz="5400" b="1" dirty="0" smtClean="0">
-                <a:solidFill>
-                  <a:srgbClr val="660033"/>
-                </a:solidFill>
-                <a:latin typeface="微軟正黑體" pitchFamily="34" charset="-120"/>
-                <a:ea typeface="微軟正黑體" pitchFamily="34" charset="-120"/>
-              </a:rPr>
-              <a:t>光明</a:t>
-            </a:r>
-            <a:r>
-              <a:rPr lang="zh-TW" altLang="en-US" sz="5400" b="1" dirty="0">
-                <a:solidFill>
-                  <a:srgbClr val="660033"/>
-                </a:solidFill>
-                <a:latin typeface="微軟正黑體" pitchFamily="34" charset="-120"/>
-                <a:ea typeface="微軟正黑體" pitchFamily="34" charset="-120"/>
-              </a:rPr>
-              <a:t>國度</a:t>
-            </a:r>
-          </a:p>
-          <a:p>
-            <a:pPr algn="ctr">
-              <a:buNone/>
-            </a:pPr>
-            <a:r>
-              <a:rPr lang="zh-TW" altLang="en-US" sz="5400" b="1" dirty="0">
-                <a:solidFill>
-                  <a:srgbClr val="660033"/>
-                </a:solidFill>
-                <a:latin typeface="微軟正黑體" pitchFamily="34" charset="-120"/>
-                <a:ea typeface="微軟正黑體" pitchFamily="34" charset="-120"/>
-              </a:rPr>
-              <a:t>使我再次能看見</a:t>
-            </a:r>
-          </a:p>
-          <a:p>
-            <a:pPr>
-              <a:buNone/>
-            </a:pPr>
-            <a:endParaRPr lang="zh-TW" altLang="en-US" b="1" dirty="0">
+          <p:cNvPr id="43010" name="矩形 1"/>
+          <p:cNvSpPr>
+            <a:spLocks noChangeArrowheads="1"/>
+          </p:cNvSpPr>
+          <p:nvPr/>
+        </p:nvSpPr>
+        <p:spPr bwMode="auto">
+          <a:xfrm>
+            <a:off x="0" y="1844675"/>
+            <a:ext cx="9144000" cy="4248150"/>
+          </a:xfrm>
+          <a:prstGeom prst="rect">
+            <a:avLst/>
+          </a:prstGeom>
+          <a:noFill/>
+          <a:ln w="9525">
+            <a:noFill/>
+            <a:miter lim="800000"/>
+            <a:headEnd/>
+            <a:tailEnd/>
+          </a:ln>
+        </p:spPr>
+        <p:txBody>
+          <a:bodyPr>
+            <a:spAutoFit/>
+          </a:bodyPr>
+          <a:lstStyle/>
+          <a:p>
+            <a:pPr algn="ctr"/>
+            <a:r>
+              <a:rPr kumimoji="0" lang="zh-TW" altLang="zh-TW" sz="5400" b="1" dirty="0" smtClean="0">
+                <a:solidFill>
+                  <a:srgbClr val="FFFF00"/>
+                </a:solidFill>
+                <a:latin typeface="標楷體" pitchFamily="65" charset="-120"/>
+                <a:ea typeface="標楷體" pitchFamily="65" charset="-120"/>
+              </a:rPr>
+              <a:t>主日學</a:t>
+            </a:r>
+            <a:r>
+              <a:rPr kumimoji="0" lang="en-US" altLang="zh-TW" sz="5400" b="1" dirty="0" smtClean="0">
+                <a:solidFill>
+                  <a:srgbClr val="FFFF00"/>
+                </a:solidFill>
+                <a:latin typeface="標楷體" pitchFamily="65" charset="-120"/>
+                <a:ea typeface="標楷體" pitchFamily="65" charset="-120"/>
+              </a:rPr>
+              <a:t>  </a:t>
+            </a:r>
+            <a:r>
+              <a:rPr kumimoji="0" lang="zh-TW" altLang="zh-TW" sz="5400" b="1" dirty="0" smtClean="0">
+                <a:solidFill>
+                  <a:srgbClr val="FFFF00"/>
+                </a:solidFill>
+                <a:latin typeface="標楷體" pitchFamily="65" charset="-120"/>
+                <a:ea typeface="標楷體" pitchFamily="65" charset="-120"/>
+              </a:rPr>
+              <a:t>主日學</a:t>
+            </a:r>
+            <a:endParaRPr kumimoji="0" lang="zh-TW" altLang="en-US" sz="5400" b="1" dirty="0">
               <a:solidFill>
-                <a:srgbClr val="660033"/>
+                <a:srgbClr val="FFFF00"/>
               </a:solidFill>
-              <a:latin typeface="微軟正黑體" pitchFamily="34" charset="-120"/>
-              <a:ea typeface="微軟正黑體" pitchFamily="34" charset="-120"/>
+              <a:latin typeface="標楷體" pitchFamily="65" charset="-120"/>
+              <a:ea typeface="標楷體" pitchFamily="65" charset="-120"/>
             </a:endParaRPr>
           </a:p>
+          <a:p>
+            <a:pPr algn="ctr"/>
+            <a:r>
+              <a:rPr kumimoji="0" lang="zh-TW" altLang="zh-TW" sz="5400" b="1" dirty="0">
+                <a:solidFill>
+                  <a:srgbClr val="FFFF00"/>
+                </a:solidFill>
+                <a:latin typeface="標楷體" pitchFamily="65" charset="-120"/>
+                <a:ea typeface="標楷體" pitchFamily="65" charset="-120"/>
+              </a:rPr>
+              <a:t>將聖經教導</a:t>
+            </a:r>
+            <a:r>
+              <a:rPr kumimoji="0" lang="zh-TW" altLang="zh-TW" sz="5400" b="1" dirty="0" smtClean="0">
+                <a:solidFill>
+                  <a:srgbClr val="FFFF00"/>
+                </a:solidFill>
+                <a:latin typeface="標楷體" pitchFamily="65" charset="-120"/>
+                <a:ea typeface="標楷體" pitchFamily="65" charset="-120"/>
+              </a:rPr>
+              <a:t>人</a:t>
+            </a:r>
+            <a:r>
+              <a:rPr kumimoji="0" lang="en-US" altLang="zh-TW" sz="5400" b="1" dirty="0" smtClean="0">
+                <a:solidFill>
+                  <a:srgbClr val="FFFF00"/>
+                </a:solidFill>
+                <a:latin typeface="標楷體" pitchFamily="65" charset="-120"/>
+                <a:ea typeface="標楷體" pitchFamily="65" charset="-120"/>
+              </a:rPr>
+              <a:t>  </a:t>
+            </a:r>
+            <a:r>
+              <a:rPr kumimoji="0" lang="zh-TW" altLang="zh-TW" sz="5400" b="1" dirty="0" smtClean="0">
+                <a:solidFill>
+                  <a:srgbClr val="FFFF00"/>
+                </a:solidFill>
+                <a:latin typeface="標楷體" pitchFamily="65" charset="-120"/>
+                <a:ea typeface="標楷體" pitchFamily="65" charset="-120"/>
+              </a:rPr>
+              <a:t>老年人</a:t>
+            </a:r>
+            <a:endParaRPr lang="en-US" altLang="zh-TW" sz="5400" b="1" dirty="0">
+              <a:solidFill>
+                <a:srgbClr val="FFFF00"/>
+              </a:solidFill>
+              <a:latin typeface="標楷體" pitchFamily="65" charset="-120"/>
+              <a:ea typeface="標楷體" pitchFamily="65" charset="-120"/>
+            </a:endParaRPr>
+          </a:p>
+          <a:p>
+            <a:pPr algn="ctr"/>
+            <a:r>
+              <a:rPr kumimoji="0" lang="zh-TW" altLang="zh-TW" sz="5400" b="1" dirty="0" smtClean="0">
+                <a:solidFill>
+                  <a:srgbClr val="FFFF00"/>
+                </a:solidFill>
+                <a:latin typeface="標楷體" pitchFamily="65" charset="-120"/>
+                <a:ea typeface="標楷體" pitchFamily="65" charset="-120"/>
+              </a:rPr>
+              <a:t>少年人</a:t>
+            </a:r>
+            <a:r>
+              <a:rPr kumimoji="0" lang="zh-TW" altLang="zh-TW" sz="5400" b="1" dirty="0">
+                <a:solidFill>
+                  <a:srgbClr val="FFFF00"/>
+                </a:solidFill>
+                <a:latin typeface="標楷體" pitchFamily="65" charset="-120"/>
+                <a:ea typeface="標楷體" pitchFamily="65" charset="-120"/>
+              </a:rPr>
+              <a:t>來與真理</a:t>
+            </a:r>
+            <a:r>
+              <a:rPr kumimoji="0" lang="zh-TW" altLang="zh-TW" sz="5400" b="1" dirty="0" smtClean="0">
+                <a:solidFill>
+                  <a:srgbClr val="FFFF00"/>
+                </a:solidFill>
+                <a:latin typeface="標楷體" pitchFamily="65" charset="-120"/>
+                <a:ea typeface="標楷體" pitchFamily="65" charset="-120"/>
+              </a:rPr>
+              <a:t>親近</a:t>
+            </a:r>
+            <a:endParaRPr kumimoji="0" lang="zh-TW" altLang="en-US" sz="5400" b="1" dirty="0">
+              <a:solidFill>
+                <a:srgbClr val="FFFF00"/>
+              </a:solidFill>
+              <a:latin typeface="標楷體" pitchFamily="65" charset="-120"/>
+              <a:ea typeface="標楷體" pitchFamily="65" charset="-120"/>
+            </a:endParaRPr>
+          </a:p>
+          <a:p>
+            <a:pPr algn="ctr"/>
+            <a:r>
+              <a:rPr kumimoji="0" lang="zh-TW" altLang="zh-TW" sz="5400" b="1" dirty="0">
+                <a:solidFill>
+                  <a:srgbClr val="FFFF00"/>
+                </a:solidFill>
+                <a:latin typeface="標楷體" pitchFamily="65" charset="-120"/>
+                <a:ea typeface="標楷體" pitchFamily="65" charset="-120"/>
+              </a:rPr>
+              <a:t>兄弟妹相關心齊勉勵見</a:t>
+            </a:r>
+            <a:r>
+              <a:rPr kumimoji="0" lang="zh-TW" altLang="zh-TW" sz="5400" b="1" dirty="0" smtClean="0">
+                <a:solidFill>
+                  <a:srgbClr val="FFFF00"/>
+                </a:solidFill>
+                <a:latin typeface="標楷體" pitchFamily="65" charset="-120"/>
+                <a:ea typeface="標楷體" pitchFamily="65" charset="-120"/>
+              </a:rPr>
+              <a:t>真心</a:t>
+            </a:r>
+            <a:endParaRPr kumimoji="0" lang="en-US" altLang="zh-TW" sz="5400" b="1" dirty="0" smtClean="0">
+              <a:solidFill>
+                <a:srgbClr val="FFFF00"/>
+              </a:solidFill>
+              <a:latin typeface="標楷體" pitchFamily="65" charset="-120"/>
+              <a:ea typeface="標楷體" pitchFamily="65" charset="-120"/>
+            </a:endParaRPr>
+          </a:p>
+          <a:p>
+            <a:pPr algn="ctr"/>
+            <a:r>
+              <a:rPr kumimoji="0" lang="zh-TW" altLang="zh-TW" sz="5400" b="1" dirty="0" smtClean="0">
+                <a:solidFill>
+                  <a:srgbClr val="FFFF00"/>
+                </a:solidFill>
+                <a:latin typeface="標楷體" pitchFamily="65" charset="-120"/>
+                <a:ea typeface="標楷體" pitchFamily="65" charset="-120"/>
+              </a:rPr>
+              <a:t>一起</a:t>
+            </a:r>
+            <a:r>
+              <a:rPr kumimoji="0" lang="zh-TW" altLang="zh-TW" sz="5400" b="1" dirty="0">
+                <a:solidFill>
+                  <a:srgbClr val="FFFF00"/>
+                </a:solidFill>
+                <a:latin typeface="標楷體" pitchFamily="65" charset="-120"/>
+                <a:ea typeface="標楷體" pitchFamily="65" charset="-120"/>
+              </a:rPr>
+              <a:t>哼出歡樂</a:t>
+            </a:r>
+            <a:r>
+              <a:rPr kumimoji="0" lang="zh-TW" altLang="zh-TW" sz="5400" b="1" dirty="0" smtClean="0">
+                <a:solidFill>
+                  <a:srgbClr val="FFFF00"/>
+                </a:solidFill>
+                <a:latin typeface="標楷體" pitchFamily="65" charset="-120"/>
+                <a:ea typeface="標楷體" pitchFamily="65" charset="-120"/>
+              </a:rPr>
+              <a:t>音韻</a:t>
+            </a:r>
+            <a:endParaRPr kumimoji="0" lang="zh-TW" altLang="en-US" sz="5400" b="1" dirty="0">
+              <a:solidFill>
+                <a:srgbClr val="FFFF00"/>
+              </a:solidFill>
+              <a:latin typeface="標楷體" pitchFamily="65" charset="-120"/>
+              <a:ea typeface="標楷體" pitchFamily="65" charset="-120"/>
+            </a:endParaRPr>
+          </a:p>
+        </p:txBody>
+      </p:sp>
+      <p:sp>
+        <p:nvSpPr>
+          <p:cNvPr id="43011" name="矩形 2"/>
+          <p:cNvSpPr>
+            <a:spLocks noChangeArrowheads="1"/>
+          </p:cNvSpPr>
+          <p:nvPr/>
+        </p:nvSpPr>
+        <p:spPr bwMode="auto">
+          <a:xfrm>
+            <a:off x="3203575" y="476250"/>
+            <a:ext cx="2311400" cy="831850"/>
+          </a:xfrm>
+          <a:prstGeom prst="rect">
+            <a:avLst/>
+          </a:prstGeom>
+          <a:noFill/>
+          <a:ln w="9525">
+            <a:noFill/>
+            <a:miter lim="800000"/>
+            <a:headEnd/>
+            <a:tailEnd/>
+          </a:ln>
+        </p:spPr>
+        <p:txBody>
+          <a:bodyPr>
+            <a:spAutoFit/>
+          </a:bodyPr>
+          <a:lstStyle/>
+          <a:p>
+            <a:r>
+              <a:rPr kumimoji="0" lang="zh-TW" altLang="zh-TW" sz="4800" b="1" dirty="0">
+                <a:solidFill>
+                  <a:srgbClr val="FFFF00"/>
+                </a:solidFill>
+                <a:latin typeface="標楷體" pitchFamily="65" charset="-120"/>
+                <a:ea typeface="標楷體" pitchFamily="65" charset="-120"/>
+              </a:rPr>
+              <a:t>主日學</a:t>
+            </a:r>
+            <a:endParaRPr kumimoji="0" lang="zh-TW" altLang="en-US" sz="4800" b="1" dirty="0">
+              <a:latin typeface="標楷體" pitchFamily="65" charset="-120"/>
+              <a:ea typeface="標楷體" pitchFamily="65" charset="-120"/>
+            </a:endParaRPr>
+          </a:p>
         </p:txBody>
       </p:sp>
     </p:spTree>
-    <p:extLst>
-      <p:ext uri="{BB962C8B-B14F-4D97-AF65-F5344CB8AC3E}">
-        <p14:creationId xmlns="" xmlns:p14="http://schemas.microsoft.com/office/powerpoint/2010/main" val="4052404649"/>
-      </p:ext>
-    </p:extLst>
   </p:cSld>
   <p:clrMapOvr>
     <a:masterClrMapping/>
   </p:clrMapOvr>
+  <p:transition/>
   <p:timing>
     <p:tnLst>
       <p:par>
@@ -3836,6 +4801,14 @@
 <file path=ppt/slides/slide4.xml><?xml version="1.0" encoding="utf-8"?>
 <p:sld xmlns:a="http://schemas.openxmlformats.org/drawingml/2006/main" xmlns:r="http://schemas.openxmlformats.org/officeDocument/2006/relationships" xmlns:p="http://schemas.openxmlformats.org/presentationml/2006/main">
   <p:cSld>
+    <p:bg>
+      <p:bgPr>
+        <a:solidFill>
+          <a:schemeClr val="tx1"/>
+        </a:solidFill>
+        <a:effectLst/>
+      </p:bgPr>
+    </p:bg>
     <p:spTree>
       <p:nvGrpSpPr>
         <p:cNvPr id="1" name=""/>
@@ -3852,120 +4825,223 @@
       </p:grpSpPr>
       <p:sp>
         <p:nvSpPr>
-          <p:cNvPr id="2" name="標題 1"/>
-          <p:cNvSpPr>
-            <a:spLocks noGrp="1"/>
-          </p:cNvSpPr>
-          <p:nvPr>
-            <p:ph type="title"/>
-          </p:nvPr>
-        </p:nvSpPr>
-        <p:spPr/>
-        <p:txBody>
-          <a:bodyPr/>
-          <a:lstStyle/>
-          <a:p>
-            <a:r>
-              <a:rPr lang="zh-TW" altLang="en-US" b="1" dirty="0">
-                <a:solidFill>
-                  <a:srgbClr val="660033"/>
-                </a:solidFill>
-                <a:latin typeface="微軟正黑體" pitchFamily="34" charset="-120"/>
-                <a:ea typeface="微軟正黑體" pitchFamily="34" charset="-120"/>
-              </a:rPr>
-              <a:t>寶貴十架</a:t>
-            </a:r>
-          </a:p>
-        </p:txBody>
-      </p:sp>
-      <p:sp>
-        <p:nvSpPr>
-          <p:cNvPr id="3" name="內容版面配置區 2"/>
-          <p:cNvSpPr>
-            <a:spLocks noGrp="1"/>
-          </p:cNvSpPr>
-          <p:nvPr>
-            <p:ph idx="1"/>
-          </p:nvPr>
-        </p:nvSpPr>
-        <p:spPr/>
-        <p:txBody>
-          <a:bodyPr>
-            <a:normAutofit/>
+          <p:cNvPr id="44034" name="Rectangle 1"/>
+          <p:cNvSpPr>
+            <a:spLocks noChangeArrowheads="1"/>
+          </p:cNvSpPr>
+          <p:nvPr/>
+        </p:nvSpPr>
+        <p:spPr bwMode="auto">
+          <a:xfrm>
+            <a:off x="0" y="785794"/>
+            <a:ext cx="9144000" cy="5078313"/>
+          </a:xfrm>
+          <a:prstGeom prst="rect">
+            <a:avLst/>
+          </a:prstGeom>
+          <a:noFill/>
+          <a:ln w="9525">
+            <a:noFill/>
+            <a:miter lim="800000"/>
+            <a:headEnd/>
+            <a:tailEnd/>
+          </a:ln>
+        </p:spPr>
+        <p:txBody>
+          <a:bodyPr wrap="square" anchor="ctr">
+            <a:spAutoFit/>
           </a:bodyPr>
           <a:lstStyle/>
           <a:p>
-            <a:pPr algn="ctr">
-              <a:buNone/>
-            </a:pPr>
+            <a:pPr algn="ctr"/>
             <a:r>
               <a:rPr lang="zh-TW" altLang="en-US" sz="5400" b="1" dirty="0">
                 <a:solidFill>
-                  <a:srgbClr val="660033"/>
-                </a:solidFill>
-                <a:latin typeface="微軟正黑體" pitchFamily="34" charset="-120"/>
-                <a:ea typeface="微軟正黑體" pitchFamily="34" charset="-120"/>
-              </a:rPr>
-              <a:t>主耶穌 我感謝你</a:t>
-            </a:r>
-          </a:p>
-          <a:p>
-            <a:pPr algn="ctr">
-              <a:buNone/>
-            </a:pPr>
+                  <a:srgbClr val="FFFF00"/>
+                </a:solidFill>
+                <a:latin typeface="標楷體" pitchFamily="65" charset="-120"/>
+                <a:ea typeface="標楷體" pitchFamily="65" charset="-120"/>
+              </a:rPr>
+              <a:t>願意願意願意願意</a:t>
+            </a:r>
+          </a:p>
+          <a:p>
+            <a:pPr algn="ctr"/>
             <a:r>
               <a:rPr lang="zh-TW" altLang="en-US" sz="5400" b="1" dirty="0">
                 <a:solidFill>
-                  <a:srgbClr val="660033"/>
-                </a:solidFill>
-                <a:latin typeface="微軟正黑體" pitchFamily="34" charset="-120"/>
-                <a:ea typeface="微軟正黑體" pitchFamily="34" charset="-120"/>
-              </a:rPr>
-              <a:t>你的寶血 為我而流</a:t>
-            </a:r>
-          </a:p>
-          <a:p>
-            <a:pPr algn="ctr">
-              <a:buNone/>
-            </a:pPr>
+                  <a:srgbClr val="FFFF00"/>
+                </a:solidFill>
+                <a:latin typeface="標楷體" pitchFamily="65" charset="-120"/>
+                <a:ea typeface="標楷體" pitchFamily="65" charset="-120"/>
+              </a:rPr>
+              <a:t>聽祂愛的</a:t>
+            </a:r>
+            <a:r>
+              <a:rPr lang="zh-TW" altLang="en-US" sz="5400" b="1" dirty="0" smtClean="0">
+                <a:solidFill>
+                  <a:srgbClr val="FFFF00"/>
+                </a:solidFill>
+                <a:latin typeface="標楷體" pitchFamily="65" charset="-120"/>
+                <a:ea typeface="標楷體" pitchFamily="65" charset="-120"/>
+              </a:rPr>
+              <a:t>教訓</a:t>
+            </a:r>
+            <a:endParaRPr lang="zh-TW" altLang="en-US" sz="5400" b="1" dirty="0">
+              <a:solidFill>
+                <a:srgbClr val="FFFF00"/>
+              </a:solidFill>
+              <a:latin typeface="標楷體" pitchFamily="65" charset="-120"/>
+              <a:ea typeface="標楷體" pitchFamily="65" charset="-120"/>
+            </a:endParaRPr>
+          </a:p>
+          <a:p>
+            <a:pPr algn="ctr"/>
             <a:r>
               <a:rPr lang="zh-TW" altLang="en-US" sz="5400" b="1" dirty="0">
                 <a:solidFill>
-                  <a:srgbClr val="660033"/>
-                </a:solidFill>
-                <a:latin typeface="微軟正黑體" pitchFamily="34" charset="-120"/>
-                <a:ea typeface="微軟正黑體" pitchFamily="34" charset="-120"/>
-              </a:rPr>
-              <a:t>寶貴十架上 醫治恩典湧流</a:t>
-            </a:r>
-          </a:p>
-          <a:p>
-            <a:pPr algn="ctr">
-              <a:buNone/>
-            </a:pPr>
+                  <a:srgbClr val="FFFF00"/>
+                </a:solidFill>
+                <a:latin typeface="標楷體" pitchFamily="65" charset="-120"/>
+                <a:ea typeface="標楷體" pitchFamily="65" charset="-120"/>
+              </a:rPr>
+              <a:t>硏究聖經不了解最緊要去</a:t>
+            </a:r>
+            <a:r>
+              <a:rPr lang="zh-TW" altLang="en-US" sz="5400" b="1" dirty="0" smtClean="0">
+                <a:solidFill>
+                  <a:srgbClr val="FFFF00"/>
+                </a:solidFill>
+                <a:latin typeface="標楷體" pitchFamily="65" charset="-120"/>
+                <a:ea typeface="標楷體" pitchFamily="65" charset="-120"/>
+              </a:rPr>
+              <a:t>問</a:t>
+            </a:r>
+            <a:endParaRPr lang="zh-TW" altLang="en-US" sz="5400" b="1" dirty="0">
+              <a:solidFill>
+                <a:srgbClr val="FFFF00"/>
+              </a:solidFill>
+              <a:latin typeface="標楷體" pitchFamily="65" charset="-120"/>
+              <a:ea typeface="標楷體" pitchFamily="65" charset="-120"/>
+            </a:endParaRPr>
+          </a:p>
+          <a:p>
+            <a:pPr algn="ctr"/>
             <a:r>
               <a:rPr lang="zh-TW" altLang="en-US" sz="5400" b="1" dirty="0">
                 <a:solidFill>
-                  <a:srgbClr val="660033"/>
-                </a:solidFill>
-                <a:latin typeface="微軟正黑體" pitchFamily="34" charset="-120"/>
-                <a:ea typeface="微軟正黑體" pitchFamily="34" charset="-120"/>
-              </a:rPr>
-              <a:t>使我完全得自由</a:t>
-            </a:r>
+                  <a:srgbClr val="FFFF00"/>
+                </a:solidFill>
+                <a:latin typeface="標楷體" pitchFamily="65" charset="-120"/>
+                <a:ea typeface="標楷體" pitchFamily="65" charset="-120"/>
+              </a:rPr>
+              <a:t>做個做個做個做個好</a:t>
+            </a:r>
+            <a:r>
+              <a:rPr lang="zh-TW" altLang="en-US" sz="5400" b="1" dirty="0" smtClean="0">
+                <a:solidFill>
+                  <a:srgbClr val="FFFF00"/>
+                </a:solidFill>
+                <a:latin typeface="標楷體" pitchFamily="65" charset="-120"/>
+                <a:ea typeface="標楷體" pitchFamily="65" charset="-120"/>
+              </a:rPr>
+              <a:t>學生</a:t>
+            </a:r>
+            <a:endParaRPr lang="zh-TW" altLang="en-US" sz="5400" b="1" dirty="0">
+              <a:solidFill>
+                <a:srgbClr val="FFFF00"/>
+              </a:solidFill>
+              <a:latin typeface="標楷體" pitchFamily="65" charset="-120"/>
+              <a:ea typeface="標楷體" pitchFamily="65" charset="-120"/>
+            </a:endParaRPr>
+          </a:p>
+          <a:p>
+            <a:pPr algn="ctr"/>
+            <a:r>
+              <a:rPr lang="zh-TW" altLang="en-US" sz="5400" b="1" dirty="0">
+                <a:solidFill>
+                  <a:srgbClr val="FFFF00"/>
+                </a:solidFill>
+                <a:latin typeface="標楷體" pitchFamily="65" charset="-120"/>
+                <a:ea typeface="標楷體" pitchFamily="65" charset="-120"/>
+              </a:rPr>
+              <a:t>遵主旨意作快樂</a:t>
+            </a:r>
+            <a:r>
+              <a:rPr lang="zh-TW" altLang="en-US" sz="5400" b="1" dirty="0" smtClean="0">
+                <a:solidFill>
+                  <a:srgbClr val="FFFF00"/>
+                </a:solidFill>
+                <a:latin typeface="標楷體" pitchFamily="65" charset="-120"/>
+                <a:ea typeface="標楷體" pitchFamily="65" charset="-120"/>
+              </a:rPr>
+              <a:t>人</a:t>
+            </a:r>
+            <a:endParaRPr lang="zh-TW" altLang="en-US" sz="5400" b="1" dirty="0">
+              <a:solidFill>
+                <a:srgbClr val="FFFF00"/>
+              </a:solidFill>
+              <a:latin typeface="標楷體" pitchFamily="65" charset="-120"/>
+              <a:ea typeface="標楷體" pitchFamily="65" charset="-120"/>
+            </a:endParaRPr>
+          </a:p>
+          <a:p>
+            <a:pPr algn="ctr"/>
+            <a:r>
+              <a:rPr lang="zh-TW" altLang="en-US" sz="5400" b="1" dirty="0">
+                <a:solidFill>
+                  <a:srgbClr val="FFFF00"/>
+                </a:solidFill>
+                <a:latin typeface="標楷體" pitchFamily="65" charset="-120"/>
+                <a:ea typeface="標楷體" pitchFamily="65" charset="-120"/>
+              </a:rPr>
+              <a:t>完全</a:t>
+            </a:r>
+            <a:r>
+              <a:rPr lang="zh-TW" altLang="en-US" sz="5400" b="1" dirty="0" smtClean="0">
+                <a:solidFill>
+                  <a:srgbClr val="FFFF00"/>
+                </a:solidFill>
+                <a:latin typeface="標楷體" pitchFamily="65" charset="-120"/>
+                <a:ea typeface="標楷體" pitchFamily="65" charset="-120"/>
+              </a:rPr>
+              <a:t>奉獻  步</a:t>
+            </a:r>
+            <a:r>
+              <a:rPr lang="zh-TW" altLang="en-US" sz="5400" b="1" dirty="0">
+                <a:solidFill>
+                  <a:srgbClr val="FFFF00"/>
+                </a:solidFill>
+                <a:latin typeface="標楷體" pitchFamily="65" charset="-120"/>
+                <a:ea typeface="標楷體" pitchFamily="65" charset="-120"/>
+              </a:rPr>
+              <a:t>向</a:t>
+            </a:r>
+            <a:r>
+              <a:rPr lang="zh-TW" altLang="en-US" sz="5400" b="1" dirty="0" smtClean="0">
+                <a:solidFill>
+                  <a:srgbClr val="FFFF00"/>
+                </a:solidFill>
+                <a:latin typeface="標楷體" pitchFamily="65" charset="-120"/>
+                <a:ea typeface="標楷體" pitchFamily="65" charset="-120"/>
+              </a:rPr>
+              <a:t>永生</a:t>
+            </a:r>
+            <a:endParaRPr lang="zh-TW" altLang="en-US" sz="5400" b="1" dirty="0">
+              <a:solidFill>
+                <a:srgbClr val="FFFF00"/>
+              </a:solidFill>
+              <a:ea typeface="標楷體" pitchFamily="65" charset="-120"/>
+            </a:endParaRPr>
           </a:p>
         </p:txBody>
       </p:sp>
     </p:spTree>
-    <p:extLst>
-      <p:ext uri="{BB962C8B-B14F-4D97-AF65-F5344CB8AC3E}">
-        <p14:creationId xmlns="" xmlns:p14="http://schemas.microsoft.com/office/powerpoint/2010/main" val="2976795936"/>
-      </p:ext>
-    </p:extLst>
   </p:cSld>
   <p:clrMapOvr>
     <a:masterClrMapping/>
   </p:clrMapOvr>
+  <p:transition/>
   <p:timing>
     <p:tnLst>
       <p:par>
@@ -4033,6 +5109,342 @@
         </p:nvSpPr>
         <p:spPr/>
         <p:txBody>
+          <a:bodyPr/>
+          <a:lstStyle/>
+          <a:p>
+            <a:pPr algn="ctr">
+              <a:buNone/>
+            </a:pPr>
+            <a:r>
+              <a:rPr lang="zh-TW" altLang="en-US" sz="5400" b="1" dirty="0">
+                <a:solidFill>
+                  <a:srgbClr val="660033"/>
+                </a:solidFill>
+                <a:latin typeface="微軟正黑體" pitchFamily="34" charset="-120"/>
+                <a:ea typeface="微軟正黑體" pitchFamily="34" charset="-120"/>
+              </a:rPr>
+              <a:t>主耶穌 我感謝你</a:t>
+            </a:r>
+          </a:p>
+          <a:p>
+            <a:pPr algn="ctr">
+              <a:buNone/>
+            </a:pPr>
+            <a:r>
+              <a:rPr lang="zh-TW" altLang="en-US" sz="5400" b="1" dirty="0">
+                <a:solidFill>
+                  <a:srgbClr val="660033"/>
+                </a:solidFill>
+                <a:latin typeface="微軟正黑體" pitchFamily="34" charset="-120"/>
+                <a:ea typeface="微軟正黑體" pitchFamily="34" charset="-120"/>
+              </a:rPr>
+              <a:t>你的身體 為我而捨</a:t>
+            </a:r>
+          </a:p>
+          <a:p>
+            <a:pPr algn="ctr">
+              <a:buNone/>
+            </a:pPr>
+            <a:r>
+              <a:rPr lang="zh-TW" altLang="en-US" sz="5400" b="1" dirty="0">
+                <a:solidFill>
+                  <a:srgbClr val="660033"/>
+                </a:solidFill>
+                <a:latin typeface="微軟正黑體" pitchFamily="34" charset="-120"/>
+                <a:ea typeface="微軟正黑體" pitchFamily="34" charset="-120"/>
+              </a:rPr>
+              <a:t>帶我出黑暗 </a:t>
+            </a:r>
+            <a:r>
+              <a:rPr lang="zh-TW" altLang="en-US" sz="5400" b="1" dirty="0" smtClean="0">
+                <a:solidFill>
+                  <a:srgbClr val="660033"/>
+                </a:solidFill>
+                <a:latin typeface="微軟正黑體" pitchFamily="34" charset="-120"/>
+                <a:ea typeface="微軟正黑體" pitchFamily="34" charset="-120"/>
+              </a:rPr>
+              <a:t>進</a:t>
+            </a:r>
+            <a:r>
+              <a:rPr lang="zh-CN" altLang="en-US" sz="5400" b="1" dirty="0" smtClean="0">
+                <a:solidFill>
+                  <a:srgbClr val="660033"/>
+                </a:solidFill>
+                <a:latin typeface="微軟正黑體" pitchFamily="34" charset="-120"/>
+                <a:ea typeface="微軟正黑體" pitchFamily="34" charset="-120"/>
+              </a:rPr>
+              <a:t>入</a:t>
+            </a:r>
+            <a:r>
+              <a:rPr lang="zh-TW" altLang="en-US" sz="5400" b="1" dirty="0" smtClean="0">
+                <a:solidFill>
+                  <a:srgbClr val="660033"/>
+                </a:solidFill>
+                <a:latin typeface="微軟正黑體" pitchFamily="34" charset="-120"/>
+                <a:ea typeface="微軟正黑體" pitchFamily="34" charset="-120"/>
+              </a:rPr>
+              <a:t>光明</a:t>
+            </a:r>
+            <a:r>
+              <a:rPr lang="zh-TW" altLang="en-US" sz="5400" b="1" dirty="0">
+                <a:solidFill>
+                  <a:srgbClr val="660033"/>
+                </a:solidFill>
+                <a:latin typeface="微軟正黑體" pitchFamily="34" charset="-120"/>
+                <a:ea typeface="微軟正黑體" pitchFamily="34" charset="-120"/>
+              </a:rPr>
+              <a:t>國度</a:t>
+            </a:r>
+          </a:p>
+          <a:p>
+            <a:pPr algn="ctr">
+              <a:buNone/>
+            </a:pPr>
+            <a:r>
+              <a:rPr lang="zh-TW" altLang="en-US" sz="5400" b="1" dirty="0">
+                <a:solidFill>
+                  <a:srgbClr val="660033"/>
+                </a:solidFill>
+                <a:latin typeface="微軟正黑體" pitchFamily="34" charset="-120"/>
+                <a:ea typeface="微軟正黑體" pitchFamily="34" charset="-120"/>
+              </a:rPr>
+              <a:t>使我再次能看見</a:t>
+            </a:r>
+          </a:p>
+          <a:p>
+            <a:pPr>
+              <a:buNone/>
+            </a:pPr>
+            <a:endParaRPr lang="zh-TW" altLang="en-US" b="1" dirty="0">
+              <a:solidFill>
+                <a:srgbClr val="660033"/>
+              </a:solidFill>
+              <a:latin typeface="微軟正黑體" pitchFamily="34" charset="-120"/>
+              <a:ea typeface="微軟正黑體" pitchFamily="34" charset="-120"/>
+            </a:endParaRPr>
+          </a:p>
+        </p:txBody>
+      </p:sp>
+    </p:spTree>
+    <p:extLst>
+      <p:ext uri="{BB962C8B-B14F-4D97-AF65-F5344CB8AC3E}">
+        <p14:creationId xmlns="" xmlns:p14="http://schemas.microsoft.com/office/powerpoint/2010/main" val="4052404649"/>
+      </p:ext>
+    </p:extLst>
+  </p:cSld>
+  <p:clrMapOvr>
+    <a:masterClrMapping/>
+  </p:clrMapOvr>
+  <p:timing>
+    <p:tnLst>
+      <p:par>
+        <p:cTn id="1" dur="indefinite" restart="never" nodeType="tmRoot"/>
+      </p:par>
+    </p:tnLst>
+  </p:timing>
+</p:sld>
+</file>
+
+<file path=ppt/slides/slide6.xml><?xml version="1.0" encoding="utf-8"?>
+<p:sld xmlns:a="http://schemas.openxmlformats.org/drawingml/2006/main" xmlns:r="http://schemas.openxmlformats.org/officeDocument/2006/relationships" xmlns:p="http://schemas.openxmlformats.org/presentationml/2006/main">
+  <p:cSld>
+    <p:spTree>
+      <p:nvGrpSpPr>
+        <p:cNvPr id="1" name=""/>
+        <p:cNvGrpSpPr/>
+        <p:nvPr/>
+      </p:nvGrpSpPr>
+      <p:grpSpPr>
+        <a:xfrm>
+          <a:off x="0" y="0"/>
+          <a:ext cx="0" cy="0"/>
+          <a:chOff x="0" y="0"/>
+          <a:chExt cx="0" cy="0"/>
+        </a:xfrm>
+      </p:grpSpPr>
+      <p:sp>
+        <p:nvSpPr>
+          <p:cNvPr id="2" name="標題 1"/>
+          <p:cNvSpPr>
+            <a:spLocks noGrp="1"/>
+          </p:cNvSpPr>
+          <p:nvPr>
+            <p:ph type="title"/>
+          </p:nvPr>
+        </p:nvSpPr>
+        <p:spPr/>
+        <p:txBody>
+          <a:bodyPr/>
+          <a:lstStyle/>
+          <a:p>
+            <a:r>
+              <a:rPr lang="zh-TW" altLang="en-US" b="1" dirty="0">
+                <a:solidFill>
+                  <a:srgbClr val="660033"/>
+                </a:solidFill>
+                <a:latin typeface="微軟正黑體" pitchFamily="34" charset="-120"/>
+                <a:ea typeface="微軟正黑體" pitchFamily="34" charset="-120"/>
+              </a:rPr>
+              <a:t>寶貴十架</a:t>
+            </a:r>
+          </a:p>
+        </p:txBody>
+      </p:sp>
+      <p:sp>
+        <p:nvSpPr>
+          <p:cNvPr id="3" name="內容版面配置區 2"/>
+          <p:cNvSpPr>
+            <a:spLocks noGrp="1"/>
+          </p:cNvSpPr>
+          <p:nvPr>
+            <p:ph idx="1"/>
+          </p:nvPr>
+        </p:nvSpPr>
+        <p:spPr/>
+        <p:txBody>
+          <a:bodyPr>
+            <a:normAutofit/>
+          </a:bodyPr>
+          <a:lstStyle/>
+          <a:p>
+            <a:pPr algn="ctr">
+              <a:buNone/>
+            </a:pPr>
+            <a:r>
+              <a:rPr lang="zh-TW" altLang="en-US" sz="5400" b="1" dirty="0">
+                <a:solidFill>
+                  <a:srgbClr val="660033"/>
+                </a:solidFill>
+                <a:latin typeface="微軟正黑體" pitchFamily="34" charset="-120"/>
+                <a:ea typeface="微軟正黑體" pitchFamily="34" charset="-120"/>
+              </a:rPr>
+              <a:t>主耶穌 我感謝你</a:t>
+            </a:r>
+          </a:p>
+          <a:p>
+            <a:pPr algn="ctr">
+              <a:buNone/>
+            </a:pPr>
+            <a:r>
+              <a:rPr lang="zh-TW" altLang="en-US" sz="5400" b="1" dirty="0">
+                <a:solidFill>
+                  <a:srgbClr val="660033"/>
+                </a:solidFill>
+                <a:latin typeface="微軟正黑體" pitchFamily="34" charset="-120"/>
+                <a:ea typeface="微軟正黑體" pitchFamily="34" charset="-120"/>
+              </a:rPr>
+              <a:t>你的寶血 為我而流</a:t>
+            </a:r>
+          </a:p>
+          <a:p>
+            <a:pPr algn="ctr">
+              <a:buNone/>
+            </a:pPr>
+            <a:r>
+              <a:rPr lang="zh-TW" altLang="en-US" sz="5400" b="1" dirty="0">
+                <a:solidFill>
+                  <a:srgbClr val="660033"/>
+                </a:solidFill>
+                <a:latin typeface="微軟正黑體" pitchFamily="34" charset="-120"/>
+                <a:ea typeface="微軟正黑體" pitchFamily="34" charset="-120"/>
+              </a:rPr>
+              <a:t>寶貴十架上 醫治恩典湧流</a:t>
+            </a:r>
+          </a:p>
+          <a:p>
+            <a:pPr algn="ctr">
+              <a:buNone/>
+            </a:pPr>
+            <a:r>
+              <a:rPr lang="zh-TW" altLang="en-US" sz="5400" b="1" dirty="0">
+                <a:solidFill>
+                  <a:srgbClr val="660033"/>
+                </a:solidFill>
+                <a:latin typeface="微軟正黑體" pitchFamily="34" charset="-120"/>
+                <a:ea typeface="微軟正黑體" pitchFamily="34" charset="-120"/>
+              </a:rPr>
+              <a:t>使我完全得自由</a:t>
+            </a:r>
+          </a:p>
+        </p:txBody>
+      </p:sp>
+    </p:spTree>
+    <p:extLst>
+      <p:ext uri="{BB962C8B-B14F-4D97-AF65-F5344CB8AC3E}">
+        <p14:creationId xmlns="" xmlns:p14="http://schemas.microsoft.com/office/powerpoint/2010/main" val="2976795936"/>
+      </p:ext>
+    </p:extLst>
+  </p:cSld>
+  <p:clrMapOvr>
+    <a:masterClrMapping/>
+  </p:clrMapOvr>
+  <p:timing>
+    <p:tnLst>
+      <p:par>
+        <p:cTn id="1" dur="indefinite" restart="never" nodeType="tmRoot"/>
+      </p:par>
+    </p:tnLst>
+  </p:timing>
+</p:sld>
+</file>
+
+<file path=ppt/slides/slide7.xml><?xml version="1.0" encoding="utf-8"?>
+<p:sld xmlns:a="http://schemas.openxmlformats.org/drawingml/2006/main" xmlns:r="http://schemas.openxmlformats.org/officeDocument/2006/relationships" xmlns:p="http://schemas.openxmlformats.org/presentationml/2006/main">
+  <p:cSld>
+    <p:spTree>
+      <p:nvGrpSpPr>
+        <p:cNvPr id="1" name=""/>
+        <p:cNvGrpSpPr/>
+        <p:nvPr/>
+      </p:nvGrpSpPr>
+      <p:grpSpPr>
+        <a:xfrm>
+          <a:off x="0" y="0"/>
+          <a:ext cx="0" cy="0"/>
+          <a:chOff x="0" y="0"/>
+          <a:chExt cx="0" cy="0"/>
+        </a:xfrm>
+      </p:grpSpPr>
+      <p:sp>
+        <p:nvSpPr>
+          <p:cNvPr id="2" name="標題 1"/>
+          <p:cNvSpPr>
+            <a:spLocks noGrp="1"/>
+          </p:cNvSpPr>
+          <p:nvPr>
+            <p:ph type="title"/>
+          </p:nvPr>
+        </p:nvSpPr>
+        <p:spPr/>
+        <p:txBody>
+          <a:bodyPr/>
+          <a:lstStyle/>
+          <a:p>
+            <a:r>
+              <a:rPr lang="zh-TW" altLang="en-US" b="1" dirty="0">
+                <a:solidFill>
+                  <a:srgbClr val="660033"/>
+                </a:solidFill>
+                <a:latin typeface="微軟正黑體" pitchFamily="34" charset="-120"/>
+                <a:ea typeface="微軟正黑體" pitchFamily="34" charset="-120"/>
+              </a:rPr>
+              <a:t>寶貴十架</a:t>
+            </a:r>
+          </a:p>
+        </p:txBody>
+      </p:sp>
+      <p:sp>
+        <p:nvSpPr>
+          <p:cNvPr id="3" name="內容版面配置區 2"/>
+          <p:cNvSpPr>
+            <a:spLocks noGrp="1"/>
+          </p:cNvSpPr>
+          <p:nvPr>
+            <p:ph idx="1"/>
+          </p:nvPr>
+        </p:nvSpPr>
+        <p:spPr/>
+        <p:txBody>
           <a:bodyPr>
             <a:noAutofit/>
           </a:bodyPr>
@@ -4120,6 +5532,682 @@
         <p14:creationId xmlns="" xmlns:p14="http://schemas.microsoft.com/office/powerpoint/2010/main" val="1434212421"/>
       </p:ext>
     </p:extLst>
+  </p:cSld>
+  <p:clrMapOvr>
+    <a:masterClrMapping/>
+  </p:clrMapOvr>
+  <p:timing>
+    <p:tnLst>
+      <p:par>
+        <p:cTn id="1" dur="indefinite" restart="never" nodeType="tmRoot"/>
+      </p:par>
+    </p:tnLst>
+  </p:timing>
+</p:sld>
+</file>
+
+<file path=ppt/slides/slide8.xml><?xml version="1.0" encoding="utf-8"?>
+<p:sld xmlns:a="http://schemas.openxmlformats.org/drawingml/2006/main" xmlns:r="http://schemas.openxmlformats.org/officeDocument/2006/relationships" xmlns:p="http://schemas.openxmlformats.org/presentationml/2006/main">
+  <p:cSld>
+    <p:spTree>
+      <p:nvGrpSpPr>
+        <p:cNvPr id="1" name=""/>
+        <p:cNvGrpSpPr/>
+        <p:nvPr/>
+      </p:nvGrpSpPr>
+      <p:grpSpPr>
+        <a:xfrm>
+          <a:off x="0" y="0"/>
+          <a:ext cx="0" cy="0"/>
+          <a:chOff x="0" y="0"/>
+          <a:chExt cx="0" cy="0"/>
+        </a:xfrm>
+      </p:grpSpPr>
+      <p:sp>
+        <p:nvSpPr>
+          <p:cNvPr id="4" name="標題 3"/>
+          <p:cNvSpPr>
+            <a:spLocks noGrp="1"/>
+          </p:cNvSpPr>
+          <p:nvPr>
+            <p:ph type="title"/>
+          </p:nvPr>
+        </p:nvSpPr>
+        <p:spPr/>
+        <p:txBody>
+          <a:bodyPr>
+            <a:normAutofit/>
+          </a:bodyPr>
+          <a:lstStyle/>
+          <a:p>
+            <a:r>
+              <a:rPr lang="zh-TW" altLang="en-US" b="1" dirty="0">
+                <a:solidFill>
+                  <a:srgbClr val="660033"/>
+                </a:solidFill>
+                <a:latin typeface="微軟正黑體" pitchFamily="34" charset="-120"/>
+                <a:ea typeface="微軟正黑體" pitchFamily="34" charset="-120"/>
+              </a:rPr>
+              <a:t>因祂</a:t>
+            </a:r>
+            <a:r>
+              <a:rPr lang="zh-TW" altLang="en-US" b="1" dirty="0" smtClean="0">
+                <a:solidFill>
+                  <a:srgbClr val="660033"/>
+                </a:solidFill>
+                <a:latin typeface="微軟正黑體" pitchFamily="34" charset="-120"/>
+                <a:ea typeface="微軟正黑體" pitchFamily="34" charset="-120"/>
+              </a:rPr>
+              <a:t>活著</a:t>
+            </a:r>
+            <a:r>
+              <a:rPr lang="zh-TW" altLang="en-US" dirty="0" smtClean="0"/>
+              <a:t>    </a:t>
+            </a:r>
+            <a:r>
+              <a:rPr lang="en-US" b="1" dirty="0" err="1" smtClean="0">
+                <a:solidFill>
+                  <a:srgbClr val="002060"/>
+                </a:solidFill>
+              </a:rPr>
+              <a:t>Vì</a:t>
+            </a:r>
+            <a:r>
+              <a:rPr lang="en-US" b="1" dirty="0" smtClean="0">
+                <a:solidFill>
+                  <a:srgbClr val="002060"/>
+                </a:solidFill>
+              </a:rPr>
+              <a:t> </a:t>
+            </a:r>
+            <a:r>
+              <a:rPr lang="en-US" b="1" dirty="0" err="1">
+                <a:solidFill>
+                  <a:srgbClr val="002060"/>
+                </a:solidFill>
+              </a:rPr>
+              <a:t>Giê-su</a:t>
+            </a:r>
+            <a:r>
+              <a:rPr lang="en-US" b="1" dirty="0">
+                <a:solidFill>
+                  <a:srgbClr val="002060"/>
+                </a:solidFill>
+              </a:rPr>
+              <a:t> </a:t>
+            </a:r>
+            <a:r>
+              <a:rPr lang="en-US" b="1" dirty="0" err="1" smtClean="0">
+                <a:solidFill>
+                  <a:srgbClr val="002060"/>
+                </a:solidFill>
+              </a:rPr>
+              <a:t>Sống</a:t>
+            </a:r>
+            <a:endParaRPr lang="zh-TW" altLang="en-US" dirty="0">
+              <a:solidFill>
+                <a:srgbClr val="002060"/>
+              </a:solidFill>
+            </a:endParaRPr>
+          </a:p>
+        </p:txBody>
+      </p:sp>
+      <p:sp>
+        <p:nvSpPr>
+          <p:cNvPr id="5" name="內容版面配置區 4"/>
+          <p:cNvSpPr>
+            <a:spLocks noGrp="1"/>
+          </p:cNvSpPr>
+          <p:nvPr>
+            <p:ph idx="1"/>
+          </p:nvPr>
+        </p:nvSpPr>
+        <p:spPr>
+          <a:xfrm>
+            <a:off x="457200" y="1600201"/>
+            <a:ext cx="8258204" cy="1971676"/>
+          </a:xfrm>
+        </p:spPr>
+        <p:txBody>
+          <a:bodyPr>
+            <a:normAutofit/>
+          </a:bodyPr>
+          <a:lstStyle/>
+          <a:p>
+            <a:pPr algn="ctr">
+              <a:buNone/>
+            </a:pPr>
+            <a:r>
+              <a:rPr lang="zh-TW" altLang="en-US" sz="5400" b="1" dirty="0">
+                <a:solidFill>
+                  <a:srgbClr val="660033"/>
+                </a:solidFill>
+                <a:latin typeface="微軟正黑體" pitchFamily="34" charset="-120"/>
+                <a:ea typeface="微軟正黑體" pitchFamily="34" charset="-120"/>
+              </a:rPr>
+              <a:t>神差愛子 人稱祂耶穌</a:t>
+            </a:r>
+            <a:r>
+              <a:rPr lang="en-US" sz="5400" b="1" dirty="0">
+                <a:solidFill>
+                  <a:srgbClr val="660033"/>
+                </a:solidFill>
+                <a:latin typeface="微軟正黑體" pitchFamily="34" charset="-120"/>
+                <a:ea typeface="微軟正黑體" pitchFamily="34" charset="-120"/>
+              </a:rPr>
+              <a:t> </a:t>
+            </a:r>
+            <a:endParaRPr lang="zh-TW" altLang="en-US" sz="5400" b="1" dirty="0">
+              <a:solidFill>
+                <a:srgbClr val="660033"/>
+              </a:solidFill>
+              <a:latin typeface="微軟正黑體" pitchFamily="34" charset="-120"/>
+              <a:ea typeface="微軟正黑體" pitchFamily="34" charset="-120"/>
+            </a:endParaRPr>
+          </a:p>
+          <a:p>
+            <a:pPr algn="ctr">
+              <a:buNone/>
+            </a:pPr>
+            <a:r>
+              <a:rPr lang="zh-TW" altLang="en-US" sz="5400" b="1" dirty="0">
+                <a:solidFill>
+                  <a:srgbClr val="660033"/>
+                </a:solidFill>
+                <a:latin typeface="微軟正黑體" pitchFamily="34" charset="-120"/>
+                <a:ea typeface="微軟正黑體" pitchFamily="34" charset="-120"/>
+              </a:rPr>
+              <a:t>祂賜下愛 醫治</a:t>
+            </a:r>
+            <a:r>
+              <a:rPr lang="zh-TW" altLang="en-US" sz="5400" b="1" dirty="0" smtClean="0">
+                <a:solidFill>
+                  <a:srgbClr val="660033"/>
+                </a:solidFill>
+                <a:latin typeface="微軟正黑體" pitchFamily="34" charset="-120"/>
+                <a:ea typeface="微軟正黑體" pitchFamily="34" charset="-120"/>
+              </a:rPr>
+              <a:t>寬恕</a:t>
+            </a:r>
+            <a:endParaRPr lang="zh-TW" altLang="en-US" sz="5400" b="1" dirty="0">
+              <a:solidFill>
+                <a:srgbClr val="660033"/>
+              </a:solidFill>
+              <a:latin typeface="微軟正黑體" pitchFamily="34" charset="-120"/>
+              <a:ea typeface="微軟正黑體" pitchFamily="34" charset="-120"/>
+            </a:endParaRPr>
+          </a:p>
+        </p:txBody>
+      </p:sp>
+      <p:sp>
+        <p:nvSpPr>
+          <p:cNvPr id="6" name="內容版面配置區 4"/>
+          <p:cNvSpPr txBox="1">
+            <a:spLocks/>
+          </p:cNvSpPr>
+          <p:nvPr/>
+        </p:nvSpPr>
+        <p:spPr>
+          <a:xfrm>
+            <a:off x="0" y="3929066"/>
+            <a:ext cx="9144000" cy="2928934"/>
+          </a:xfrm>
+          <a:prstGeom prst="rect">
+            <a:avLst/>
+          </a:prstGeom>
+        </p:spPr>
+        <p:txBody>
+          <a:bodyPr vert="horz" lIns="91440" tIns="45720" rIns="91440" bIns="45720" rtlCol="0">
+            <a:normAutofit/>
+          </a:bodyPr>
+          <a:lstStyle/>
+          <a:p>
+            <a:pPr marL="342900" lvl="0" indent="-342900" algn="ctr">
+              <a:spcBef>
+                <a:spcPct val="20000"/>
+              </a:spcBef>
+            </a:pPr>
+            <a:r>
+              <a:rPr lang="vi-VN" sz="3600" dirty="0">
+                <a:solidFill>
+                  <a:srgbClr val="002060"/>
+                </a:solidFill>
+              </a:rPr>
+              <a:t>Trên trời vinh </a:t>
+            </a:r>
+            <a:r>
+              <a:rPr lang="vi-VN" sz="3600" dirty="0" smtClean="0">
+                <a:solidFill>
+                  <a:srgbClr val="002060"/>
+                </a:solidFill>
+              </a:rPr>
+              <a:t>quang</a:t>
+            </a:r>
+            <a:endParaRPr lang="en-US" sz="3600" dirty="0" smtClean="0">
+              <a:solidFill>
+                <a:srgbClr val="002060"/>
+              </a:solidFill>
+            </a:endParaRPr>
+          </a:p>
+          <a:p>
+            <a:pPr marL="342900" lvl="0" indent="-342900" algn="ctr">
+              <a:spcBef>
+                <a:spcPct val="20000"/>
+              </a:spcBef>
+            </a:pPr>
+            <a:r>
+              <a:rPr lang="vi-VN" sz="3600" dirty="0" smtClean="0">
+                <a:solidFill>
+                  <a:srgbClr val="002060"/>
+                </a:solidFill>
+              </a:rPr>
+              <a:t>Vua </a:t>
+            </a:r>
+            <a:r>
+              <a:rPr lang="vi-VN" sz="3600" dirty="0">
+                <a:solidFill>
+                  <a:srgbClr val="002060"/>
+                </a:solidFill>
+              </a:rPr>
+              <a:t>Thánh xuống gian </a:t>
+            </a:r>
+            <a:r>
+              <a:rPr lang="vi-VN" sz="3600" dirty="0" smtClean="0">
+                <a:solidFill>
+                  <a:srgbClr val="002060"/>
+                </a:solidFill>
+              </a:rPr>
+              <a:t>trần</a:t>
+            </a:r>
+            <a:endParaRPr lang="en-US" sz="3600" dirty="0" smtClean="0">
+              <a:solidFill>
+                <a:srgbClr val="002060"/>
+              </a:solidFill>
+            </a:endParaRPr>
+          </a:p>
+          <a:p>
+            <a:pPr marL="342900" lvl="0" indent="-342900" algn="ctr">
+              <a:spcBef>
+                <a:spcPct val="20000"/>
+              </a:spcBef>
+            </a:pPr>
+            <a:r>
+              <a:rPr lang="vi-VN" sz="3600" dirty="0" smtClean="0">
+                <a:solidFill>
+                  <a:srgbClr val="002060"/>
+                </a:solidFill>
+              </a:rPr>
+              <a:t>xót </a:t>
+            </a:r>
+            <a:r>
+              <a:rPr lang="vi-VN" sz="3600" dirty="0">
+                <a:solidFill>
+                  <a:srgbClr val="002060"/>
+                </a:solidFill>
+              </a:rPr>
+              <a:t>thương con người sống trong tuyệt </a:t>
+            </a:r>
+            <a:r>
+              <a:rPr lang="vi-VN" sz="3600" dirty="0" smtClean="0">
+                <a:solidFill>
+                  <a:srgbClr val="002060"/>
+                </a:solidFill>
+              </a:rPr>
+              <a:t>vọng</a:t>
+            </a:r>
+            <a:endParaRPr kumimoji="0" lang="zh-TW" altLang="en-US" sz="3600" b="0" i="0" u="none" strike="noStrike" kern="1200" cap="none" spc="0" normalizeH="0" baseline="0" noProof="0" dirty="0" smtClean="0">
+              <a:ln>
+                <a:noFill/>
+              </a:ln>
+              <a:solidFill>
+                <a:srgbClr val="002060"/>
+              </a:solidFill>
+              <a:effectLst/>
+              <a:uLnTx/>
+              <a:uFillTx/>
+              <a:latin typeface="+mn-lt"/>
+              <a:ea typeface="+mn-ea"/>
+              <a:cs typeface="+mn-cs"/>
+            </a:endParaRPr>
+          </a:p>
+        </p:txBody>
+      </p:sp>
+    </p:spTree>
+  </p:cSld>
+  <p:clrMapOvr>
+    <a:masterClrMapping/>
+  </p:clrMapOvr>
+  <p:timing>
+    <p:tnLst>
+      <p:par>
+        <p:cTn id="1" dur="indefinite" restart="never" nodeType="tmRoot"/>
+      </p:par>
+    </p:tnLst>
+  </p:timing>
+</p:sld>
+</file>
+
+<file path=ppt/slides/slide9.xml><?xml version="1.0" encoding="utf-8"?>
+<p:sld xmlns:a="http://schemas.openxmlformats.org/drawingml/2006/main" xmlns:r="http://schemas.openxmlformats.org/officeDocument/2006/relationships" xmlns:p="http://schemas.openxmlformats.org/presentationml/2006/main">
+  <p:cSld>
+    <p:spTree>
+      <p:nvGrpSpPr>
+        <p:cNvPr id="1" name=""/>
+        <p:cNvGrpSpPr/>
+        <p:nvPr/>
+      </p:nvGrpSpPr>
+      <p:grpSpPr>
+        <a:xfrm>
+          <a:off x="0" y="0"/>
+          <a:ext cx="0" cy="0"/>
+          <a:chOff x="0" y="0"/>
+          <a:chExt cx="0" cy="0"/>
+        </a:xfrm>
+      </p:grpSpPr>
+      <p:sp>
+        <p:nvSpPr>
+          <p:cNvPr id="4" name="標題 3"/>
+          <p:cNvSpPr>
+            <a:spLocks noGrp="1"/>
+          </p:cNvSpPr>
+          <p:nvPr>
+            <p:ph type="title"/>
+          </p:nvPr>
+        </p:nvSpPr>
+        <p:spPr/>
+        <p:txBody>
+          <a:bodyPr>
+            <a:normAutofit/>
+          </a:bodyPr>
+          <a:lstStyle/>
+          <a:p>
+            <a:r>
+              <a:rPr lang="zh-TW" altLang="en-US" b="1" dirty="0">
+                <a:solidFill>
+                  <a:srgbClr val="660033"/>
+                </a:solidFill>
+                <a:latin typeface="微軟正黑體" pitchFamily="34" charset="-120"/>
+                <a:ea typeface="微軟正黑體" pitchFamily="34" charset="-120"/>
+              </a:rPr>
+              <a:t>因祂</a:t>
+            </a:r>
+            <a:r>
+              <a:rPr lang="zh-TW" altLang="en-US" b="1" dirty="0" smtClean="0">
+                <a:solidFill>
+                  <a:srgbClr val="660033"/>
+                </a:solidFill>
+                <a:latin typeface="微軟正黑體" pitchFamily="34" charset="-120"/>
+                <a:ea typeface="微軟正黑體" pitchFamily="34" charset="-120"/>
+              </a:rPr>
+              <a:t>活著</a:t>
+            </a:r>
+            <a:r>
+              <a:rPr lang="zh-TW" altLang="en-US" dirty="0" smtClean="0"/>
+              <a:t>    </a:t>
+            </a:r>
+            <a:r>
+              <a:rPr lang="en-US" b="1" dirty="0" err="1" smtClean="0">
+                <a:solidFill>
+                  <a:srgbClr val="002060"/>
+                </a:solidFill>
+              </a:rPr>
+              <a:t>Vì</a:t>
+            </a:r>
+            <a:r>
+              <a:rPr lang="en-US" b="1" dirty="0" smtClean="0">
+                <a:solidFill>
+                  <a:srgbClr val="002060"/>
+                </a:solidFill>
+              </a:rPr>
+              <a:t> </a:t>
+            </a:r>
+            <a:r>
+              <a:rPr lang="en-US" b="1" dirty="0" err="1">
+                <a:solidFill>
+                  <a:srgbClr val="002060"/>
+                </a:solidFill>
+              </a:rPr>
+              <a:t>Giê-su</a:t>
+            </a:r>
+            <a:r>
+              <a:rPr lang="en-US" b="1" dirty="0">
+                <a:solidFill>
+                  <a:srgbClr val="002060"/>
+                </a:solidFill>
+              </a:rPr>
+              <a:t> </a:t>
+            </a:r>
+            <a:r>
+              <a:rPr lang="en-US" b="1" dirty="0" err="1" smtClean="0">
+                <a:solidFill>
+                  <a:srgbClr val="002060"/>
+                </a:solidFill>
+              </a:rPr>
+              <a:t>Sống</a:t>
+            </a:r>
+            <a:endParaRPr lang="zh-TW" altLang="en-US" b="1" dirty="0">
+              <a:solidFill>
+                <a:srgbClr val="002060"/>
+              </a:solidFill>
+            </a:endParaRPr>
+          </a:p>
+        </p:txBody>
+      </p:sp>
+      <p:sp>
+        <p:nvSpPr>
+          <p:cNvPr id="5" name="內容版面配置區 4"/>
+          <p:cNvSpPr>
+            <a:spLocks noGrp="1"/>
+          </p:cNvSpPr>
+          <p:nvPr>
+            <p:ph idx="1"/>
+          </p:nvPr>
+        </p:nvSpPr>
+        <p:spPr>
+          <a:xfrm>
+            <a:off x="0" y="1600201"/>
+            <a:ext cx="9144000" cy="1971676"/>
+          </a:xfrm>
+        </p:spPr>
+        <p:txBody>
+          <a:bodyPr>
+            <a:noAutofit/>
+          </a:bodyPr>
+          <a:lstStyle/>
+          <a:p>
+            <a:pPr algn="ctr">
+              <a:buNone/>
+            </a:pPr>
+            <a:r>
+              <a:rPr lang="zh-TW" altLang="en-US" sz="5400" b="1" dirty="0">
+                <a:solidFill>
+                  <a:srgbClr val="660033"/>
+                </a:solidFill>
+                <a:latin typeface="微軟正黑體" pitchFamily="34" charset="-120"/>
+                <a:ea typeface="微軟正黑體" pitchFamily="34" charset="-120"/>
+              </a:rPr>
+              <a:t>死裡復活 使我得自由</a:t>
+            </a:r>
+            <a:r>
+              <a:rPr lang="en-US" altLang="en-US" sz="5400" b="1" dirty="0">
+                <a:solidFill>
+                  <a:srgbClr val="660033"/>
+                </a:solidFill>
+                <a:latin typeface="微軟正黑體" pitchFamily="34" charset="-120"/>
+                <a:ea typeface="微軟正黑體" pitchFamily="34" charset="-120"/>
+              </a:rPr>
+              <a:t> </a:t>
+            </a:r>
+            <a:endParaRPr lang="zh-TW" altLang="en-US" sz="5400" b="1" dirty="0">
+              <a:solidFill>
+                <a:srgbClr val="660033"/>
+              </a:solidFill>
+              <a:latin typeface="微軟正黑體" pitchFamily="34" charset="-120"/>
+              <a:ea typeface="微軟正黑體" pitchFamily="34" charset="-120"/>
+            </a:endParaRPr>
+          </a:p>
+          <a:p>
+            <a:pPr algn="ctr">
+              <a:buNone/>
+            </a:pPr>
+            <a:r>
+              <a:rPr lang="zh-TW" altLang="en-US" sz="5400" b="1" dirty="0">
+                <a:solidFill>
+                  <a:srgbClr val="660033"/>
+                </a:solidFill>
+                <a:latin typeface="微軟正黑體" pitchFamily="34" charset="-120"/>
+                <a:ea typeface="微軟正黑體" pitchFamily="34" charset="-120"/>
+              </a:rPr>
+              <a:t>那空墳墓就是我得救的記號</a:t>
+            </a:r>
+          </a:p>
+        </p:txBody>
+      </p:sp>
+      <p:sp>
+        <p:nvSpPr>
+          <p:cNvPr id="6" name="內容版面配置區 4"/>
+          <p:cNvSpPr txBox="1">
+            <a:spLocks/>
+          </p:cNvSpPr>
+          <p:nvPr/>
+        </p:nvSpPr>
+        <p:spPr>
+          <a:xfrm>
+            <a:off x="0" y="3929066"/>
+            <a:ext cx="9144000" cy="2928934"/>
+          </a:xfrm>
+          <a:prstGeom prst="rect">
+            <a:avLst/>
+          </a:prstGeom>
+        </p:spPr>
+        <p:txBody>
+          <a:bodyPr vert="horz" lIns="91440" tIns="45720" rIns="91440" bIns="45720" rtlCol="0">
+            <a:normAutofit/>
+          </a:bodyPr>
+          <a:lstStyle/>
+          <a:p>
+            <a:pPr marL="342900" lvl="0" indent="-342900" algn="ctr">
+              <a:spcBef>
+                <a:spcPct val="20000"/>
+              </a:spcBef>
+            </a:pPr>
+            <a:r>
+              <a:rPr lang="vi-VN" sz="3600" dirty="0">
+                <a:solidFill>
+                  <a:srgbClr val="002060"/>
+                </a:solidFill>
+              </a:rPr>
+              <a:t>Thân vàng hi </a:t>
+            </a:r>
+            <a:r>
+              <a:rPr lang="vi-VN" sz="3600" dirty="0" smtClean="0">
+                <a:solidFill>
+                  <a:srgbClr val="002060"/>
+                </a:solidFill>
+              </a:rPr>
+              <a:t>sinh</a:t>
+            </a:r>
+            <a:endParaRPr lang="en-US" sz="3600" dirty="0" smtClean="0">
+              <a:solidFill>
+                <a:srgbClr val="002060"/>
+              </a:solidFill>
+            </a:endParaRPr>
+          </a:p>
+          <a:p>
+            <a:pPr marL="342900" lvl="0" indent="-342900" algn="ctr">
+              <a:spcBef>
+                <a:spcPct val="20000"/>
+              </a:spcBef>
+            </a:pPr>
+            <a:r>
+              <a:rPr lang="vi-VN" sz="3600" dirty="0" smtClean="0">
+                <a:solidFill>
+                  <a:srgbClr val="002060"/>
+                </a:solidFill>
+              </a:rPr>
+              <a:t>Chịu </a:t>
+            </a:r>
+            <a:r>
+              <a:rPr lang="vi-VN" sz="3600" dirty="0">
+                <a:solidFill>
+                  <a:srgbClr val="002060"/>
+                </a:solidFill>
+              </a:rPr>
+              <a:t>đau thương cứu </a:t>
+            </a:r>
+            <a:r>
+              <a:rPr lang="vi-VN" sz="3600" dirty="0" smtClean="0">
+                <a:solidFill>
+                  <a:srgbClr val="002060"/>
+                </a:solidFill>
+              </a:rPr>
+              <a:t>người</a:t>
+            </a:r>
+            <a:endParaRPr lang="en-US" sz="3600" dirty="0" smtClean="0">
+              <a:solidFill>
+                <a:srgbClr val="002060"/>
+              </a:solidFill>
+            </a:endParaRPr>
+          </a:p>
+          <a:p>
+            <a:pPr marL="342900" lvl="0" indent="-342900" algn="ctr">
+              <a:spcBef>
+                <a:spcPct val="20000"/>
+              </a:spcBef>
+            </a:pPr>
+            <a:r>
+              <a:rPr lang="vi-VN" sz="3600" dirty="0" smtClean="0">
+                <a:solidFill>
+                  <a:srgbClr val="002060"/>
+                </a:solidFill>
+              </a:rPr>
+              <a:t>Hiện </a:t>
+            </a:r>
+            <a:r>
+              <a:rPr lang="vi-VN" sz="3600" dirty="0">
+                <a:solidFill>
+                  <a:srgbClr val="002060"/>
+                </a:solidFill>
+              </a:rPr>
+              <a:t>Ngài đang sống để đón muôn người </a:t>
+            </a:r>
+            <a:endParaRPr lang="en-US" sz="3600" dirty="0" smtClean="0">
+              <a:solidFill>
+                <a:srgbClr val="002060"/>
+              </a:solidFill>
+            </a:endParaRPr>
+          </a:p>
+          <a:p>
+            <a:pPr marL="342900" lvl="0" indent="-342900" algn="ctr">
+              <a:spcBef>
+                <a:spcPct val="20000"/>
+              </a:spcBef>
+            </a:pPr>
+            <a:r>
+              <a:rPr lang="vi-VN" sz="3600" dirty="0" smtClean="0">
+                <a:solidFill>
+                  <a:srgbClr val="002060"/>
+                </a:solidFill>
+              </a:rPr>
+              <a:t>Tìm </a:t>
+            </a:r>
+            <a:r>
+              <a:rPr lang="vi-VN" sz="3600" dirty="0">
+                <a:solidFill>
+                  <a:srgbClr val="002060"/>
+                </a:solidFill>
+              </a:rPr>
+              <a:t>nguồn thái an</a:t>
+            </a:r>
+            <a:endParaRPr lang="zh-TW" altLang="en-US" sz="3600" dirty="0" smtClean="0">
+              <a:solidFill>
+                <a:srgbClr val="002060"/>
+              </a:solidFill>
+            </a:endParaRPr>
+          </a:p>
+        </p:txBody>
+      </p:sp>
+    </p:spTree>
   </p:cSld>
   <p:clrMapOvr>
     <a:masterClrMapping/>

</xml_diff>